<commit_message>
changed TableGeneratorPowerPoint class to remove empty table rows at the end of the powerpoint slide
</commit_message>
<xml_diff>
--- a/Templates/UpdateExistingTable7.pptx
+++ b/Templates/UpdateExistingTable7.pptx
@@ -4060,7 +4060,7 @@
         </p:nvGraphicFramePr>
         <p:xfrm>
           <a:off x="1079500" y="1016000"/>
-          <a:ext cx="6350000" cy="4389120"/>
+          <a:ext cx="6350000" cy="731520"/>
         </p:xfrm>
         <a:graphic>
           <a:graphicData uri="http://schemas.openxmlformats.org/drawingml/2006/table">
@@ -4224,526 +4224,6 @@
                         </a:rPr>
                         <a:t>Berlin</a:t>
                       </a:r>
-                    </a:p>
-                  </a:txBody>
-                  <a:tcPr/>
-                </a:tc>
-              </a:tr>
-              <a:tr h="254000">
-                <a:tc>
-                  <a:txBody>
-                    <a:bodyPr anchorCtr="0"/>
-                    <a:lstStyle/>
-                    <a:p>
-                      <a:endParaRPr/>
-                    </a:p>
-                  </a:txBody>
-                  <a:tcPr/>
-                </a:tc>
-                <a:tc>
-                  <a:txBody>
-                    <a:bodyPr anchorCtr="0"/>
-                    <a:lstStyle/>
-                    <a:p>
-                      <a:endParaRPr/>
-                    </a:p>
-                  </a:txBody>
-                  <a:tcPr/>
-                </a:tc>
-                <a:tc>
-                  <a:txBody>
-                    <a:bodyPr anchorCtr="0"/>
-                    <a:lstStyle/>
-                    <a:p>
-                      <a:endParaRPr/>
-                    </a:p>
-                  </a:txBody>
-                  <a:tcPr/>
-                </a:tc>
-                <a:tc>
-                  <a:txBody>
-                    <a:bodyPr anchorCtr="0"/>
-                    <a:lstStyle/>
-                    <a:p>
-                      <a:endParaRPr/>
-                    </a:p>
-                  </a:txBody>
-                  <a:tcPr/>
-                </a:tc>
-                <a:tc>
-                  <a:txBody>
-                    <a:bodyPr anchorCtr="0"/>
-                    <a:lstStyle/>
-                    <a:p>
-                      <a:endParaRPr/>
-                    </a:p>
-                  </a:txBody>
-                  <a:tcPr/>
-                </a:tc>
-              </a:tr>
-              <a:tr h="254000">
-                <a:tc>
-                  <a:txBody>
-                    <a:bodyPr anchorCtr="0"/>
-                    <a:lstStyle/>
-                    <a:p>
-                      <a:endParaRPr/>
-                    </a:p>
-                  </a:txBody>
-                  <a:tcPr/>
-                </a:tc>
-                <a:tc>
-                  <a:txBody>
-                    <a:bodyPr anchorCtr="0"/>
-                    <a:lstStyle/>
-                    <a:p>
-                      <a:endParaRPr/>
-                    </a:p>
-                  </a:txBody>
-                  <a:tcPr/>
-                </a:tc>
-                <a:tc>
-                  <a:txBody>
-                    <a:bodyPr anchorCtr="0"/>
-                    <a:lstStyle/>
-                    <a:p>
-                      <a:endParaRPr/>
-                    </a:p>
-                  </a:txBody>
-                  <a:tcPr/>
-                </a:tc>
-                <a:tc>
-                  <a:txBody>
-                    <a:bodyPr anchorCtr="0"/>
-                    <a:lstStyle/>
-                    <a:p>
-                      <a:endParaRPr/>
-                    </a:p>
-                  </a:txBody>
-                  <a:tcPr/>
-                </a:tc>
-                <a:tc>
-                  <a:txBody>
-                    <a:bodyPr anchorCtr="0"/>
-                    <a:lstStyle/>
-                    <a:p>
-                      <a:endParaRPr/>
-                    </a:p>
-                  </a:txBody>
-                  <a:tcPr/>
-                </a:tc>
-              </a:tr>
-              <a:tr h="254000">
-                <a:tc>
-                  <a:txBody>
-                    <a:bodyPr anchorCtr="0"/>
-                    <a:lstStyle/>
-                    <a:p>
-                      <a:endParaRPr/>
-                    </a:p>
-                  </a:txBody>
-                  <a:tcPr/>
-                </a:tc>
-                <a:tc>
-                  <a:txBody>
-                    <a:bodyPr anchorCtr="0"/>
-                    <a:lstStyle/>
-                    <a:p>
-                      <a:endParaRPr/>
-                    </a:p>
-                  </a:txBody>
-                  <a:tcPr/>
-                </a:tc>
-                <a:tc>
-                  <a:txBody>
-                    <a:bodyPr anchorCtr="0"/>
-                    <a:lstStyle/>
-                    <a:p>
-                      <a:endParaRPr/>
-                    </a:p>
-                  </a:txBody>
-                  <a:tcPr/>
-                </a:tc>
-                <a:tc>
-                  <a:txBody>
-                    <a:bodyPr anchorCtr="0"/>
-                    <a:lstStyle/>
-                    <a:p>
-                      <a:endParaRPr/>
-                    </a:p>
-                  </a:txBody>
-                  <a:tcPr/>
-                </a:tc>
-                <a:tc>
-                  <a:txBody>
-                    <a:bodyPr anchorCtr="0"/>
-                    <a:lstStyle/>
-                    <a:p>
-                      <a:endParaRPr/>
-                    </a:p>
-                  </a:txBody>
-                  <a:tcPr/>
-                </a:tc>
-              </a:tr>
-              <a:tr h="254000">
-                <a:tc>
-                  <a:txBody>
-                    <a:bodyPr anchorCtr="0"/>
-                    <a:lstStyle/>
-                    <a:p>
-                      <a:endParaRPr/>
-                    </a:p>
-                  </a:txBody>
-                  <a:tcPr/>
-                </a:tc>
-                <a:tc>
-                  <a:txBody>
-                    <a:bodyPr anchorCtr="0"/>
-                    <a:lstStyle/>
-                    <a:p>
-                      <a:endParaRPr/>
-                    </a:p>
-                  </a:txBody>
-                  <a:tcPr/>
-                </a:tc>
-                <a:tc>
-                  <a:txBody>
-                    <a:bodyPr anchorCtr="0"/>
-                    <a:lstStyle/>
-                    <a:p>
-                      <a:endParaRPr/>
-                    </a:p>
-                  </a:txBody>
-                  <a:tcPr/>
-                </a:tc>
-                <a:tc>
-                  <a:txBody>
-                    <a:bodyPr anchorCtr="0"/>
-                    <a:lstStyle/>
-                    <a:p>
-                      <a:endParaRPr/>
-                    </a:p>
-                  </a:txBody>
-                  <a:tcPr/>
-                </a:tc>
-                <a:tc>
-                  <a:txBody>
-                    <a:bodyPr anchorCtr="0"/>
-                    <a:lstStyle/>
-                    <a:p>
-                      <a:endParaRPr/>
-                    </a:p>
-                  </a:txBody>
-                  <a:tcPr/>
-                </a:tc>
-              </a:tr>
-              <a:tr h="254000">
-                <a:tc>
-                  <a:txBody>
-                    <a:bodyPr anchorCtr="0"/>
-                    <a:lstStyle/>
-                    <a:p>
-                      <a:endParaRPr/>
-                    </a:p>
-                  </a:txBody>
-                  <a:tcPr/>
-                </a:tc>
-                <a:tc>
-                  <a:txBody>
-                    <a:bodyPr anchorCtr="0"/>
-                    <a:lstStyle/>
-                    <a:p>
-                      <a:endParaRPr/>
-                    </a:p>
-                  </a:txBody>
-                  <a:tcPr/>
-                </a:tc>
-                <a:tc>
-                  <a:txBody>
-                    <a:bodyPr anchorCtr="0"/>
-                    <a:lstStyle/>
-                    <a:p>
-                      <a:endParaRPr/>
-                    </a:p>
-                  </a:txBody>
-                  <a:tcPr/>
-                </a:tc>
-                <a:tc>
-                  <a:txBody>
-                    <a:bodyPr anchorCtr="0"/>
-                    <a:lstStyle/>
-                    <a:p>
-                      <a:endParaRPr/>
-                    </a:p>
-                  </a:txBody>
-                  <a:tcPr/>
-                </a:tc>
-                <a:tc>
-                  <a:txBody>
-                    <a:bodyPr anchorCtr="0"/>
-                    <a:lstStyle/>
-                    <a:p>
-                      <a:endParaRPr/>
-                    </a:p>
-                  </a:txBody>
-                  <a:tcPr/>
-                </a:tc>
-              </a:tr>
-              <a:tr h="254000">
-                <a:tc>
-                  <a:txBody>
-                    <a:bodyPr anchorCtr="0"/>
-                    <a:lstStyle/>
-                    <a:p>
-                      <a:endParaRPr/>
-                    </a:p>
-                  </a:txBody>
-                  <a:tcPr/>
-                </a:tc>
-                <a:tc>
-                  <a:txBody>
-                    <a:bodyPr anchorCtr="0"/>
-                    <a:lstStyle/>
-                    <a:p>
-                      <a:endParaRPr/>
-                    </a:p>
-                  </a:txBody>
-                  <a:tcPr/>
-                </a:tc>
-                <a:tc>
-                  <a:txBody>
-                    <a:bodyPr anchorCtr="0"/>
-                    <a:lstStyle/>
-                    <a:p>
-                      <a:endParaRPr/>
-                    </a:p>
-                  </a:txBody>
-                  <a:tcPr/>
-                </a:tc>
-                <a:tc>
-                  <a:txBody>
-                    <a:bodyPr anchorCtr="0"/>
-                    <a:lstStyle/>
-                    <a:p>
-                      <a:endParaRPr/>
-                    </a:p>
-                  </a:txBody>
-                  <a:tcPr/>
-                </a:tc>
-                <a:tc>
-                  <a:txBody>
-                    <a:bodyPr anchorCtr="0"/>
-                    <a:lstStyle/>
-                    <a:p>
-                      <a:endParaRPr/>
-                    </a:p>
-                  </a:txBody>
-                  <a:tcPr/>
-                </a:tc>
-              </a:tr>
-              <a:tr h="254000">
-                <a:tc>
-                  <a:txBody>
-                    <a:bodyPr anchorCtr="0"/>
-                    <a:lstStyle/>
-                    <a:p>
-                      <a:endParaRPr/>
-                    </a:p>
-                  </a:txBody>
-                  <a:tcPr/>
-                </a:tc>
-                <a:tc>
-                  <a:txBody>
-                    <a:bodyPr anchorCtr="0"/>
-                    <a:lstStyle/>
-                    <a:p>
-                      <a:endParaRPr/>
-                    </a:p>
-                  </a:txBody>
-                  <a:tcPr/>
-                </a:tc>
-                <a:tc>
-                  <a:txBody>
-                    <a:bodyPr anchorCtr="0"/>
-                    <a:lstStyle/>
-                    <a:p>
-                      <a:endParaRPr/>
-                    </a:p>
-                  </a:txBody>
-                  <a:tcPr/>
-                </a:tc>
-                <a:tc>
-                  <a:txBody>
-                    <a:bodyPr anchorCtr="0"/>
-                    <a:lstStyle/>
-                    <a:p>
-                      <a:endParaRPr/>
-                    </a:p>
-                  </a:txBody>
-                  <a:tcPr/>
-                </a:tc>
-                <a:tc>
-                  <a:txBody>
-                    <a:bodyPr anchorCtr="0"/>
-                    <a:lstStyle/>
-                    <a:p>
-                      <a:endParaRPr/>
-                    </a:p>
-                  </a:txBody>
-                  <a:tcPr/>
-                </a:tc>
-              </a:tr>
-              <a:tr h="254000">
-                <a:tc>
-                  <a:txBody>
-                    <a:bodyPr anchorCtr="0"/>
-                    <a:lstStyle/>
-                    <a:p>
-                      <a:endParaRPr/>
-                    </a:p>
-                  </a:txBody>
-                  <a:tcPr/>
-                </a:tc>
-                <a:tc>
-                  <a:txBody>
-                    <a:bodyPr anchorCtr="0"/>
-                    <a:lstStyle/>
-                    <a:p>
-                      <a:endParaRPr/>
-                    </a:p>
-                  </a:txBody>
-                  <a:tcPr/>
-                </a:tc>
-                <a:tc>
-                  <a:txBody>
-                    <a:bodyPr anchorCtr="0"/>
-                    <a:lstStyle/>
-                    <a:p>
-                      <a:endParaRPr/>
-                    </a:p>
-                  </a:txBody>
-                  <a:tcPr/>
-                </a:tc>
-                <a:tc>
-                  <a:txBody>
-                    <a:bodyPr anchorCtr="0"/>
-                    <a:lstStyle/>
-                    <a:p>
-                      <a:endParaRPr/>
-                    </a:p>
-                  </a:txBody>
-                  <a:tcPr/>
-                </a:tc>
-                <a:tc>
-                  <a:txBody>
-                    <a:bodyPr anchorCtr="0"/>
-                    <a:lstStyle/>
-                    <a:p>
-                      <a:endParaRPr/>
-                    </a:p>
-                  </a:txBody>
-                  <a:tcPr/>
-                </a:tc>
-              </a:tr>
-              <a:tr h="254000">
-                <a:tc>
-                  <a:txBody>
-                    <a:bodyPr anchorCtr="0"/>
-                    <a:lstStyle/>
-                    <a:p>
-                      <a:endParaRPr/>
-                    </a:p>
-                  </a:txBody>
-                  <a:tcPr/>
-                </a:tc>
-                <a:tc>
-                  <a:txBody>
-                    <a:bodyPr anchorCtr="0"/>
-                    <a:lstStyle/>
-                    <a:p>
-                      <a:endParaRPr/>
-                    </a:p>
-                  </a:txBody>
-                  <a:tcPr/>
-                </a:tc>
-                <a:tc>
-                  <a:txBody>
-                    <a:bodyPr anchorCtr="0"/>
-                    <a:lstStyle/>
-                    <a:p>
-                      <a:endParaRPr/>
-                    </a:p>
-                  </a:txBody>
-                  <a:tcPr/>
-                </a:tc>
-                <a:tc>
-                  <a:txBody>
-                    <a:bodyPr anchorCtr="0"/>
-                    <a:lstStyle/>
-                    <a:p>
-                      <a:endParaRPr/>
-                    </a:p>
-                  </a:txBody>
-                  <a:tcPr/>
-                </a:tc>
-                <a:tc>
-                  <a:txBody>
-                    <a:bodyPr anchorCtr="0"/>
-                    <a:lstStyle/>
-                    <a:p>
-                      <a:endParaRPr/>
-                    </a:p>
-                  </a:txBody>
-                  <a:tcPr/>
-                </a:tc>
-              </a:tr>
-              <a:tr h="254000">
-                <a:tc>
-                  <a:txBody>
-                    <a:bodyPr anchorCtr="0"/>
-                    <a:lstStyle/>
-                    <a:p>
-                      <a:endParaRPr/>
-                    </a:p>
-                  </a:txBody>
-                  <a:tcPr/>
-                </a:tc>
-                <a:tc>
-                  <a:txBody>
-                    <a:bodyPr anchorCtr="0"/>
-                    <a:lstStyle/>
-                    <a:p>
-                      <a:endParaRPr/>
-                    </a:p>
-                  </a:txBody>
-                  <a:tcPr/>
-                </a:tc>
-                <a:tc>
-                  <a:txBody>
-                    <a:bodyPr anchorCtr="0"/>
-                    <a:lstStyle/>
-                    <a:p>
-                      <a:endParaRPr/>
-                    </a:p>
-                  </a:txBody>
-                  <a:tcPr/>
-                </a:tc>
-                <a:tc>
-                  <a:txBody>
-                    <a:bodyPr anchorCtr="0"/>
-                    <a:lstStyle/>
-                    <a:p>
-                      <a:endParaRPr/>
-                    </a:p>
-                  </a:txBody>
-                  <a:tcPr/>
-                </a:tc>
-                <a:tc>
-                  <a:txBody>
-                    <a:bodyPr anchorCtr="0"/>
-                    <a:lstStyle/>
-                    <a:p>
-                      <a:endParaRPr/>
                     </a:p>
                   </a:txBody>
                   <a:tcPr/>
@@ -12697,71 +12177,71 @@
         <a:latin typeface="Calibri"/>
         <a:ea typeface=""/>
         <a:cs typeface=""/>
-        <a:font script="Geor" typeface="Sylfaen"/>
-        <a:font script="Jpan" typeface="ＭＳ Ｐゴシック"/>
-        <a:font script="Khmr" typeface="MoolBoran"/>
-        <a:font script="Arab" typeface="Times New Roman"/>
-        <a:font script="Yiii" typeface="Microsoft Yi Baiti"/>
+        <a:font script="Sinh" typeface="Iskoola Pota"/>
+        <a:font script="Laoo" typeface="DokChampa"/>
         <a:font script="Telu" typeface="Gautami"/>
-        <a:font script="Beng" typeface="Vrinda"/>
-        <a:font script="Tibt" typeface="Microsoft Himalaya"/>
-        <a:font script="Laoo" typeface="DokChampa"/>
-        <a:font script="Orya" typeface="Kalinga"/>
-        <a:font script="Hant" typeface="新細明體"/>
-        <a:font script="Guru" typeface="Raavi"/>
-        <a:font script="Hang" typeface="맑은 고딕"/>
-        <a:font script="Gujr" typeface="Shruti"/>
-        <a:font script="Cans" typeface="Euphemia"/>
-        <a:font script="Cher" typeface="Plantagenet Cherokee"/>
-        <a:font script="Sinh" typeface="Iskoola Pota"/>
-        <a:font script="Deva" typeface="Mangal"/>
-        <a:font script="Knda" typeface="Tunga"/>
-        <a:font script="Hebr" typeface="Times New Roman"/>
-        <a:font script="Thai" typeface="Angsana New"/>
-        <a:font script="Thaa" typeface="MV Boli"/>
-        <a:font script="Syrc" typeface="Estrangelo Edessa"/>
         <a:font script="Hans" typeface="宋体"/>
         <a:font script="Viet" typeface="Times New Roman"/>
+        <a:font script="Beng" typeface="Vrinda"/>
+        <a:font script="Cher" typeface="Plantagenet Cherokee"/>
+        <a:font script="Ethi" typeface="Nyala"/>
+        <a:font script="Hang" typeface="맑은 고딕"/>
+        <a:font script="Khmr" typeface="MoolBoran"/>
         <a:font script="Uigh" typeface="Microsoft Uighur"/>
-        <a:font script="Ethi" typeface="Nyala"/>
+        <a:font script="Tibt" typeface="Microsoft Himalaya"/>
+        <a:font script="Knda" typeface="Tunga"/>
         <a:font script="Mong" typeface="Mongolian Baiti"/>
+        <a:font script="Arab" typeface="Times New Roman"/>
+        <a:font script="Hebr" typeface="Times New Roman"/>
+        <a:font script="Hant" typeface="新細明體"/>
+        <a:font script="Cans" typeface="Euphemia"/>
+        <a:font script="Thai" typeface="Angsana New"/>
+        <a:font script="Taml" typeface="Latha"/>
+        <a:font script="Jpan" typeface="ＭＳ Ｐゴシック"/>
         <a:font script="Mlym" typeface="Kartika"/>
-        <a:font script="Taml" typeface="Latha"/>
+        <a:font script="Yiii" typeface="Microsoft Yi Baiti"/>
+        <a:font script="Geor" typeface="Sylfaen"/>
+        <a:font script="Thaa" typeface="MV Boli"/>
+        <a:font script="Gujr" typeface="Shruti"/>
+        <a:font script="Deva" typeface="Mangal"/>
+        <a:font script="Guru" typeface="Raavi"/>
+        <a:font script="Orya" typeface="Kalinga"/>
+        <a:font script="Syrc" typeface="Estrangelo Edessa"/>
       </a:majorFont>
       <a:minorFont>
         <a:latin typeface="Calibri"/>
         <a:ea typeface=""/>
         <a:cs typeface=""/>
-        <a:font script="Geor" typeface="Sylfaen"/>
-        <a:font script="Jpan" typeface="ＭＳ Ｐゴシック"/>
-        <a:font script="Khmr" typeface="DaunPenh"/>
-        <a:font script="Arab" typeface="Arial"/>
-        <a:font script="Yiii" typeface="Microsoft Yi Baiti"/>
+        <a:font script="Sinh" typeface="Iskoola Pota"/>
+        <a:font script="Laoo" typeface="DokChampa"/>
         <a:font script="Telu" typeface="Gautami"/>
-        <a:font script="Beng" typeface="Vrinda"/>
-        <a:font script="Tibt" typeface="Microsoft Himalaya"/>
-        <a:font script="Laoo" typeface="DokChampa"/>
-        <a:font script="Orya" typeface="Kalinga"/>
-        <a:font script="Hant" typeface="新細明體"/>
-        <a:font script="Guru" typeface="Raavi"/>
-        <a:font script="Hang" typeface="맑은 고딕"/>
-        <a:font script="Gujr" typeface="Shruti"/>
-        <a:font script="Cans" typeface="Euphemia"/>
-        <a:font script="Cher" typeface="Plantagenet Cherokee"/>
-        <a:font script="Sinh" typeface="Iskoola Pota"/>
-        <a:font script="Deva" typeface="Mangal"/>
-        <a:font script="Knda" typeface="Tunga"/>
-        <a:font script="Hebr" typeface="Arial"/>
-        <a:font script="Thai" typeface="Cordia New"/>
-        <a:font script="Thaa" typeface="MV Boli"/>
-        <a:font script="Syrc" typeface="Estrangelo Edessa"/>
         <a:font script="Hans" typeface="宋体"/>
         <a:font script="Viet" typeface="Arial"/>
+        <a:font script="Beng" typeface="Vrinda"/>
+        <a:font script="Cher" typeface="Plantagenet Cherokee"/>
+        <a:font script="Ethi" typeface="Nyala"/>
+        <a:font script="Hang" typeface="맑은 고딕"/>
+        <a:font script="Khmr" typeface="DaunPenh"/>
         <a:font script="Uigh" typeface="Microsoft Uighur"/>
-        <a:font script="Ethi" typeface="Nyala"/>
+        <a:font script="Tibt" typeface="Microsoft Himalaya"/>
+        <a:font script="Knda" typeface="Tunga"/>
         <a:font script="Mong" typeface="Mongolian Baiti"/>
+        <a:font script="Arab" typeface="Arial"/>
+        <a:font script="Hebr" typeface="Arial"/>
+        <a:font script="Hant" typeface="新細明體"/>
+        <a:font script="Cans" typeface="Euphemia"/>
+        <a:font script="Thai" typeface="Cordia New"/>
+        <a:font script="Taml" typeface="Latha"/>
+        <a:font script="Jpan" typeface="ＭＳ Ｐゴシック"/>
         <a:font script="Mlym" typeface="Kartika"/>
-        <a:font script="Taml" typeface="Latha"/>
+        <a:font script="Yiii" typeface="Microsoft Yi Baiti"/>
+        <a:font script="Geor" typeface="Sylfaen"/>
+        <a:font script="Thaa" typeface="MV Boli"/>
+        <a:font script="Gujr" typeface="Shruti"/>
+        <a:font script="Deva" typeface="Mangal"/>
+        <a:font script="Guru" typeface="Raavi"/>
+        <a:font script="Orya" typeface="Kalinga"/>
+        <a:font script="Syrc" typeface="Estrangelo Edessa"/>
       </a:minorFont>
     </a:fontScheme>
     <a:fmtScheme name="Office">

</xml_diff>

<commit_message>
TableGeneratorPowerPoint changes to center allign table
</commit_message>
<xml_diff>
--- a/Templates/UpdateExistingTable7.pptx
+++ b/Templates/UpdateExistingTable7.pptx
@@ -3015,8 +3015,8 @@
           <p:nvPr/>
         </p:nvGraphicFramePr>
         <p:xfrm>
-          <a:off x="1079500" y="1016000"/>
-          <a:ext cx="8890000" cy="5303520"/>
+          <a:off x="762000" y="508000"/>
+          <a:ext cx="7620000" cy="5303520"/>
         </p:xfrm>
         <a:graphic>
           <a:graphicData uri="http://schemas.openxmlformats.org/drawingml/2006/table">
@@ -3031,7 +3031,6 @@
                 <a:gridCol w="1270000"/>
                 <a:gridCol w="1270000"/>
                 <a:gridCol w="1270000"/>
-                <a:gridCol w="1270000"/>
               </a:tblGrid>
               <a:tr h="254000">
                 <a:tc>
@@ -3050,7 +3049,7 @@
                   </a:txBody>
                   <a:tcPr>
                     <a:solidFill>
-                      <a:srgbClr val="FFFFFF"/>
+                      <a:srgbClr val="2980BA"/>
                     </a:solidFill>
                   </a:tcPr>
                 </a:tc>
@@ -3070,7 +3069,7 @@
                   </a:txBody>
                   <a:tcPr>
                     <a:solidFill>
-                      <a:srgbClr val="FFFFFF"/>
+                      <a:srgbClr val="2980BA"/>
                     </a:solidFill>
                   </a:tcPr>
                 </a:tc>
@@ -3090,7 +3089,7 @@
                   </a:txBody>
                   <a:tcPr>
                     <a:solidFill>
-                      <a:srgbClr val="FFFFFF"/>
+                      <a:srgbClr val="2980BA"/>
                     </a:solidFill>
                   </a:tcPr>
                 </a:tc>
@@ -3110,7 +3109,7 @@
                   </a:txBody>
                   <a:tcPr>
                     <a:solidFill>
-                      <a:srgbClr val="FFFFFF"/>
+                      <a:srgbClr val="2980BA"/>
                     </a:solidFill>
                   </a:tcPr>
                 </a:tc>
@@ -3130,7 +3129,7 @@
                   </a:txBody>
                   <a:tcPr>
                     <a:solidFill>
-                      <a:srgbClr val="FFFFFF"/>
+                      <a:srgbClr val="2980BA"/>
                     </a:solidFill>
                   </a:tcPr>
                 </a:tc>
@@ -3150,27 +3149,7 @@
                   </a:txBody>
                   <a:tcPr>
                     <a:solidFill>
-                      <a:srgbClr val="FFFFFF"/>
-                    </a:solidFill>
-                  </a:tcPr>
-                </a:tc>
-                <a:tc>
-                  <a:txBody>
-                    <a:bodyPr anchorCtr="0"/>
-                    <a:lstStyle/>
-                    <a:p>
-                      <a:pPr algn="l"/>
-                      <a:r>
-                        <a:rPr sz="1200" dirty="1">
-                          <a:latin typeface="Calibri"/>
-                        </a:rPr>
-                        <a:t>Postal Code</a:t>
-                      </a:r>
-                    </a:p>
-                  </a:txBody>
-                  <a:tcPr>
-                    <a:solidFill>
-                      <a:srgbClr val="FFFFFF"/>
+                      <a:srgbClr val="2980BA"/>
                     </a:solidFill>
                   </a:tcPr>
                 </a:tc>
@@ -3296,26 +3275,6 @@
                     </a:solidFill>
                   </a:tcPr>
                 </a:tc>
-                <a:tc>
-                  <a:txBody>
-                    <a:bodyPr anchorCtr="0"/>
-                    <a:lstStyle/>
-                    <a:p>
-                      <a:pPr algn="l"/>
-                      <a:r>
-                        <a:rPr sz="1200" dirty="1">
-                          <a:latin typeface="Calibri"/>
-                        </a:rPr>
-                        <a:t>10092</a:t>
-                      </a:r>
-                    </a:p>
-                  </a:txBody>
-                  <a:tcPr>
-                    <a:solidFill>
-                      <a:srgbClr val="F5F5F5"/>
-                    </a:solidFill>
-                  </a:tcPr>
-                </a:tc>
               </a:tr>
               <a:tr h="254000">
                 <a:tc>
@@ -3438,26 +3397,6 @@
                     </a:solidFill>
                   </a:tcPr>
                 </a:tc>
-                <a:tc>
-                  <a:txBody>
-                    <a:bodyPr anchorCtr="0"/>
-                    <a:lstStyle/>
-                    <a:p>
-                      <a:pPr algn="l"/>
-                      <a:r>
-                        <a:rPr sz="1200" dirty="1">
-                          <a:latin typeface="Calibri"/>
-                        </a:rPr>
-                        <a:t>10077</a:t>
-                      </a:r>
-                    </a:p>
-                  </a:txBody>
-                  <a:tcPr>
-                    <a:solidFill>
-                      <a:srgbClr val="FFFFFF"/>
-                    </a:solidFill>
-                  </a:tcPr>
-                </a:tc>
               </a:tr>
               <a:tr h="254000">
                 <a:tc>
@@ -3580,26 +3519,6 @@
                     </a:solidFill>
                   </a:tcPr>
                 </a:tc>
-                <a:tc>
-                  <a:txBody>
-                    <a:bodyPr anchorCtr="0"/>
-                    <a:lstStyle/>
-                    <a:p>
-                      <a:pPr algn="l"/>
-                      <a:r>
-                        <a:rPr sz="1200" dirty="1">
-                          <a:latin typeface="Calibri"/>
-                        </a:rPr>
-                        <a:t>10097</a:t>
-                      </a:r>
-                    </a:p>
-                  </a:txBody>
-                  <a:tcPr>
-                    <a:solidFill>
-                      <a:srgbClr val="F5F5F5"/>
-                    </a:solidFill>
-                  </a:tcPr>
-                </a:tc>
               </a:tr>
               <a:tr h="254000">
                 <a:tc>
@@ -3722,26 +3641,6 @@
                     </a:solidFill>
                   </a:tcPr>
                 </a:tc>
-                <a:tc>
-                  <a:txBody>
-                    <a:bodyPr anchorCtr="0"/>
-                    <a:lstStyle/>
-                    <a:p>
-                      <a:pPr algn="l"/>
-                      <a:r>
-                        <a:rPr sz="1200" dirty="1">
-                          <a:latin typeface="Calibri"/>
-                        </a:rPr>
-                        <a:t>10046</a:t>
-                      </a:r>
-                    </a:p>
-                  </a:txBody>
-                  <a:tcPr>
-                    <a:solidFill>
-                      <a:srgbClr val="FFFFFF"/>
-                    </a:solidFill>
-                  </a:tcPr>
-                </a:tc>
               </a:tr>
               <a:tr h="254000">
                 <a:tc>
@@ -3864,26 +3763,6 @@
                     </a:solidFill>
                   </a:tcPr>
                 </a:tc>
-                <a:tc>
-                  <a:txBody>
-                    <a:bodyPr anchorCtr="0"/>
-                    <a:lstStyle/>
-                    <a:p>
-                      <a:pPr algn="l"/>
-                      <a:r>
-                        <a:rPr sz="1200" dirty="1">
-                          <a:latin typeface="Calibri"/>
-                        </a:rPr>
-                        <a:t>10112</a:t>
-                      </a:r>
-                    </a:p>
-                  </a:txBody>
-                  <a:tcPr>
-                    <a:solidFill>
-                      <a:srgbClr val="F5F5F5"/>
-                    </a:solidFill>
-                  </a:tcPr>
-                </a:tc>
               </a:tr>
               <a:tr h="254000">
                 <a:tc>
@@ -4006,26 +3885,6 @@
                     </a:solidFill>
                   </a:tcPr>
                 </a:tc>
-                <a:tc>
-                  <a:txBody>
-                    <a:bodyPr anchorCtr="0"/>
-                    <a:lstStyle/>
-                    <a:p>
-                      <a:pPr algn="l"/>
-                      <a:r>
-                        <a:rPr sz="1200" dirty="1">
-                          <a:latin typeface="Calibri"/>
-                        </a:rPr>
-                        <a:t>10117</a:t>
-                      </a:r>
-                    </a:p>
-                  </a:txBody>
-                  <a:tcPr>
-                    <a:solidFill>
-                      <a:srgbClr val="FFFFFF"/>
-                    </a:solidFill>
-                  </a:tcPr>
-                </a:tc>
               </a:tr>
               <a:tr h="254000">
                 <a:tc>
@@ -4148,26 +4007,6 @@
                     </a:solidFill>
                   </a:tcPr>
                 </a:tc>
-                <a:tc>
-                  <a:txBody>
-                    <a:bodyPr anchorCtr="0"/>
-                    <a:lstStyle/>
-                    <a:p>
-                      <a:pPr algn="l"/>
-                      <a:r>
-                        <a:rPr sz="1200" dirty="1">
-                          <a:latin typeface="Calibri"/>
-                        </a:rPr>
-                        <a:t>10089</a:t>
-                      </a:r>
-                    </a:p>
-                  </a:txBody>
-                  <a:tcPr>
-                    <a:solidFill>
-                      <a:srgbClr val="F5F5F5"/>
-                    </a:solidFill>
-                  </a:tcPr>
-                </a:tc>
               </a:tr>
               <a:tr h="254000">
                 <a:tc>
@@ -4290,26 +4129,6 @@
                     </a:solidFill>
                   </a:tcPr>
                 </a:tc>
-                <a:tc>
-                  <a:txBody>
-                    <a:bodyPr anchorCtr="0"/>
-                    <a:lstStyle/>
-                    <a:p>
-                      <a:pPr algn="l"/>
-                      <a:r>
-                        <a:rPr sz="1200" dirty="1">
-                          <a:latin typeface="Calibri"/>
-                        </a:rPr>
-                        <a:t>10104</a:t>
-                      </a:r>
-                    </a:p>
-                  </a:txBody>
-                  <a:tcPr>
-                    <a:solidFill>
-                      <a:srgbClr val="FFFFFF"/>
-                    </a:solidFill>
-                  </a:tcPr>
-                </a:tc>
               </a:tr>
               <a:tr h="254000">
                 <a:tc>
@@ -4432,26 +4251,6 @@
                     </a:solidFill>
                   </a:tcPr>
                 </a:tc>
-                <a:tc>
-                  <a:txBody>
-                    <a:bodyPr anchorCtr="0"/>
-                    <a:lstStyle/>
-                    <a:p>
-                      <a:pPr algn="l"/>
-                      <a:r>
-                        <a:rPr sz="1200" dirty="1">
-                          <a:latin typeface="Calibri"/>
-                        </a:rPr>
-                        <a:t>10105</a:t>
-                      </a:r>
-                    </a:p>
-                  </a:txBody>
-                  <a:tcPr>
-                    <a:solidFill>
-                      <a:srgbClr val="F5F5F5"/>
-                    </a:solidFill>
-                  </a:tcPr>
-                </a:tc>
               </a:tr>
               <a:tr h="254000">
                 <a:tc>
@@ -4574,26 +4373,6 @@
                     </a:solidFill>
                   </a:tcPr>
                 </a:tc>
-                <a:tc>
-                  <a:txBody>
-                    <a:bodyPr anchorCtr="0"/>
-                    <a:lstStyle/>
-                    <a:p>
-                      <a:pPr algn="l"/>
-                      <a:r>
-                        <a:rPr sz="1200" dirty="1">
-                          <a:latin typeface="Calibri"/>
-                        </a:rPr>
-                        <a:t>10111</a:t>
-                      </a:r>
-                    </a:p>
-                  </a:txBody>
-                  <a:tcPr>
-                    <a:solidFill>
-                      <a:srgbClr val="FFFFFF"/>
-                    </a:solidFill>
-                  </a:tcPr>
-                </a:tc>
               </a:tr>
               <a:tr h="254000">
                 <a:tc>
@@ -4707,26 +4486,6 @@
                           <a:latin typeface="Calibri"/>
                         </a:rPr>
                         <a:t>UK</a:t>
-                      </a:r>
-                    </a:p>
-                  </a:txBody>
-                  <a:tcPr>
-                    <a:solidFill>
-                      <a:srgbClr val="F5F5F5"/>
-                    </a:solidFill>
-                  </a:tcPr>
-                </a:tc>
-                <a:tc>
-                  <a:txBody>
-                    <a:bodyPr anchorCtr="0"/>
-                    <a:lstStyle/>
-                    <a:p>
-                      <a:pPr algn="l"/>
-                      <a:r>
-                        <a:rPr sz="1200" dirty="1">
-                          <a:latin typeface="Calibri"/>
-                        </a:rPr>
-                        <a:t>10064</a:t>
                       </a:r>
                     </a:p>
                   </a:txBody>
@@ -4781,8 +4540,8 @@
           <p:nvPr/>
         </p:nvGraphicFramePr>
         <p:xfrm>
-          <a:off x="1079500" y="1016000"/>
-          <a:ext cx="8890000" cy="731520"/>
+          <a:off x="762000" y="508000"/>
+          <a:ext cx="7620000" cy="731520"/>
         </p:xfrm>
         <a:graphic>
           <a:graphicData uri="http://schemas.openxmlformats.org/drawingml/2006/table">
@@ -4797,7 +4556,6 @@
                 <a:gridCol w="1270000"/>
                 <a:gridCol w="1270000"/>
                 <a:gridCol w="1270000"/>
-                <a:gridCol w="1270000"/>
               </a:tblGrid>
               <a:tr h="254000">
                 <a:tc>
@@ -4815,7 +4573,7 @@
                   </a:txBody>
                   <a:tcPr>
                     <a:solidFill>
-                      <a:srgbClr val="FFFFFF"/>
+                      <a:srgbClr val="2980BA"/>
                     </a:solidFill>
                   </a:tcPr>
                 </a:tc>
@@ -4834,7 +4592,7 @@
                   </a:txBody>
                   <a:tcPr>
                     <a:solidFill>
-                      <a:srgbClr val="FFFFFF"/>
+                      <a:srgbClr val="2980BA"/>
                     </a:solidFill>
                   </a:tcPr>
                 </a:tc>
@@ -4853,7 +4611,7 @@
                   </a:txBody>
                   <a:tcPr>
                     <a:solidFill>
-                      <a:srgbClr val="FFFFFF"/>
+                      <a:srgbClr val="2980BA"/>
                     </a:solidFill>
                   </a:tcPr>
                 </a:tc>
@@ -4872,7 +4630,7 @@
                   </a:txBody>
                   <a:tcPr>
                     <a:solidFill>
-                      <a:srgbClr val="FFFFFF"/>
+                      <a:srgbClr val="2980BA"/>
                     </a:solidFill>
                   </a:tcPr>
                 </a:tc>
@@ -4891,7 +4649,7 @@
                   </a:txBody>
                   <a:tcPr>
                     <a:solidFill>
-                      <a:srgbClr val="FFFFFF"/>
+                      <a:srgbClr val="2980BA"/>
                     </a:solidFill>
                   </a:tcPr>
                 </a:tc>
@@ -4910,26 +4668,7 @@
                   </a:txBody>
                   <a:tcPr>
                     <a:solidFill>
-                      <a:srgbClr val="FFFFFF"/>
-                    </a:solidFill>
-                  </a:tcPr>
-                </a:tc>
-                <a:tc>
-                  <a:txBody>
-                    <a:bodyPr anchorCtr="0"/>
-                    <a:lstStyle/>
-                    <a:p>
-                      <a:r>
-                        <a:rPr sz="1200" dirty="1">
-                          <a:latin typeface="Calibri"/>
-                        </a:rPr>
-                        <a:t>Postal Code</a:t>
-                      </a:r>
-                    </a:p>
-                  </a:txBody>
-                  <a:tcPr>
-                    <a:solidFill>
-                      <a:srgbClr val="FFFFFF"/>
+                      <a:srgbClr val="2980BA"/>
                     </a:solidFill>
                   </a:tcPr>
                 </a:tc>
@@ -5040,25 +4779,6 @@
                           <a:latin typeface="Calibri"/>
                         </a:rPr>
                         <a:t>France</a:t>
-                      </a:r>
-                    </a:p>
-                  </a:txBody>
-                  <a:tcPr>
-                    <a:solidFill>
-                      <a:srgbClr val="FFFFFF"/>
-                    </a:solidFill>
-                  </a:tcPr>
-                </a:tc>
-                <a:tc>
-                  <a:txBody>
-                    <a:bodyPr anchorCtr="0"/>
-                    <a:lstStyle/>
-                    <a:p>
-                      <a:r>
-                        <a:rPr sz="1200" dirty="1">
-                          <a:latin typeface="Calibri"/>
-                        </a:rPr>
-                        <a:t>10092</a:t>
                       </a:r>
                     </a:p>
                   </a:txBody>
@@ -5113,8 +4833,8 @@
           <p:nvPr/>
         </p:nvGraphicFramePr>
         <p:xfrm>
-          <a:off x="1079500" y="1016000"/>
-          <a:ext cx="8890000" cy="5486400"/>
+          <a:off x="762000" y="508000"/>
+          <a:ext cx="7620000" cy="5486400"/>
         </p:xfrm>
         <a:graphic>
           <a:graphicData uri="http://schemas.openxmlformats.org/drawingml/2006/table">
@@ -5129,7 +4849,6 @@
                 <a:gridCol w="1270000"/>
                 <a:gridCol w="1270000"/>
                 <a:gridCol w="1270000"/>
-                <a:gridCol w="1270000"/>
               </a:tblGrid>
               <a:tr h="254000">
                 <a:tc>
@@ -5147,7 +4866,7 @@
                   </a:txBody>
                   <a:tcPr>
                     <a:solidFill>
-                      <a:srgbClr val="FFFFFF"/>
+                      <a:srgbClr val="2980BA"/>
                     </a:solidFill>
                   </a:tcPr>
                 </a:tc>
@@ -5166,7 +4885,7 @@
                   </a:txBody>
                   <a:tcPr>
                     <a:solidFill>
-                      <a:srgbClr val="FFFFFF"/>
+                      <a:srgbClr val="2980BA"/>
                     </a:solidFill>
                   </a:tcPr>
                 </a:tc>
@@ -5185,7 +4904,7 @@
                   </a:txBody>
                   <a:tcPr>
                     <a:solidFill>
-                      <a:srgbClr val="FFFFFF"/>
+                      <a:srgbClr val="2980BA"/>
                     </a:solidFill>
                   </a:tcPr>
                 </a:tc>
@@ -5204,7 +4923,7 @@
                   </a:txBody>
                   <a:tcPr>
                     <a:solidFill>
-                      <a:srgbClr val="FFFFFF"/>
+                      <a:srgbClr val="2980BA"/>
                     </a:solidFill>
                   </a:tcPr>
                 </a:tc>
@@ -5223,7 +4942,7 @@
                   </a:txBody>
                   <a:tcPr>
                     <a:solidFill>
-                      <a:srgbClr val="FFFFFF"/>
+                      <a:srgbClr val="2980BA"/>
                     </a:solidFill>
                   </a:tcPr>
                 </a:tc>
@@ -5242,26 +4961,7 @@
                   </a:txBody>
                   <a:tcPr>
                     <a:solidFill>
-                      <a:srgbClr val="FFFFFF"/>
-                    </a:solidFill>
-                  </a:tcPr>
-                </a:tc>
-                <a:tc>
-                  <a:txBody>
-                    <a:bodyPr anchorCtr="0"/>
-                    <a:lstStyle/>
-                    <a:p>
-                      <a:r>
-                        <a:rPr sz="1200" dirty="1">
-                          <a:latin typeface="Calibri"/>
-                        </a:rPr>
-                        <a:t>Postal Code</a:t>
-                      </a:r>
-                    </a:p>
-                  </a:txBody>
-                  <a:tcPr>
-                    <a:solidFill>
-                      <a:srgbClr val="FFFFFF"/>
+                      <a:srgbClr val="2980BA"/>
                     </a:solidFill>
                   </a:tcPr>
                 </a:tc>
@@ -5381,25 +5081,6 @@
                     </a:solidFill>
                   </a:tcPr>
                 </a:tc>
-                <a:tc>
-                  <a:txBody>
-                    <a:bodyPr anchorCtr="0"/>
-                    <a:lstStyle/>
-                    <a:p>
-                      <a:r>
-                        <a:rPr sz="1200" dirty="1">
-                          <a:latin typeface="Calibri"/>
-                        </a:rPr>
-                        <a:t>10057</a:t>
-                      </a:r>
-                    </a:p>
-                  </a:txBody>
-                  <a:tcPr>
-                    <a:solidFill>
-                      <a:srgbClr val="FFFFFF"/>
-                    </a:solidFill>
-                  </a:tcPr>
-                </a:tc>
               </a:tr>
               <a:tr h="254000">
                 <a:tc>
@@ -5516,25 +5197,6 @@
                     </a:solidFill>
                   </a:tcPr>
                 </a:tc>
-                <a:tc>
-                  <a:txBody>
-                    <a:bodyPr anchorCtr="0"/>
-                    <a:lstStyle/>
-                    <a:p>
-                      <a:r>
-                        <a:rPr sz="1200" dirty="1">
-                          <a:latin typeface="Calibri"/>
-                        </a:rPr>
-                        <a:t>10056</a:t>
-                      </a:r>
-                    </a:p>
-                  </a:txBody>
-                  <a:tcPr>
-                    <a:solidFill>
-                      <a:srgbClr val="F5F5F5"/>
-                    </a:solidFill>
-                  </a:tcPr>
-                </a:tc>
               </a:tr>
               <a:tr h="254000">
                 <a:tc>
@@ -5651,25 +5313,6 @@
                     </a:solidFill>
                   </a:tcPr>
                 </a:tc>
-                <a:tc>
-                  <a:txBody>
-                    <a:bodyPr anchorCtr="0"/>
-                    <a:lstStyle/>
-                    <a:p>
-                      <a:r>
-                        <a:rPr sz="1200" dirty="1">
-                          <a:latin typeface="Calibri"/>
-                        </a:rPr>
-                        <a:t>10065</a:t>
-                      </a:r>
-                    </a:p>
-                  </a:txBody>
-                  <a:tcPr>
-                    <a:solidFill>
-                      <a:srgbClr val="FFFFFF"/>
-                    </a:solidFill>
-                  </a:tcPr>
-                </a:tc>
               </a:tr>
               <a:tr h="254000">
                 <a:tc>
@@ -5786,25 +5429,6 @@
                     </a:solidFill>
                   </a:tcPr>
                 </a:tc>
-                <a:tc>
-                  <a:txBody>
-                    <a:bodyPr anchorCtr="0"/>
-                    <a:lstStyle/>
-                    <a:p>
-                      <a:r>
-                        <a:rPr sz="1200" dirty="1">
-                          <a:latin typeface="Calibri"/>
-                        </a:rPr>
-                        <a:t>10087</a:t>
-                      </a:r>
-                    </a:p>
-                  </a:txBody>
-                  <a:tcPr>
-                    <a:solidFill>
-                      <a:srgbClr val="F5F5F5"/>
-                    </a:solidFill>
-                  </a:tcPr>
-                </a:tc>
               </a:tr>
               <a:tr h="254000">
                 <a:tc>
@@ -5921,25 +5545,6 @@
                     </a:solidFill>
                   </a:tcPr>
                 </a:tc>
-                <a:tc>
-                  <a:txBody>
-                    <a:bodyPr anchorCtr="0"/>
-                    <a:lstStyle/>
-                    <a:p>
-                      <a:r>
-                        <a:rPr sz="1200" dirty="1">
-                          <a:latin typeface="Calibri"/>
-                        </a:rPr>
-                        <a:t>10039</a:t>
-                      </a:r>
-                    </a:p>
-                  </a:txBody>
-                  <a:tcPr>
-                    <a:solidFill>
-                      <a:srgbClr val="FFFFFF"/>
-                    </a:solidFill>
-                  </a:tcPr>
-                </a:tc>
               </a:tr>
               <a:tr h="254000">
                 <a:tc>
@@ -6056,25 +5661,6 @@
                     </a:solidFill>
                   </a:tcPr>
                 </a:tc>
-                <a:tc>
-                  <a:txBody>
-                    <a:bodyPr anchorCtr="0"/>
-                    <a:lstStyle/>
-                    <a:p>
-                      <a:r>
-                        <a:rPr sz="1200" dirty="1">
-                          <a:latin typeface="Calibri"/>
-                        </a:rPr>
-                        <a:t>10067</a:t>
-                      </a:r>
-                    </a:p>
-                  </a:txBody>
-                  <a:tcPr>
-                    <a:solidFill>
-                      <a:srgbClr val="F5F5F5"/>
-                    </a:solidFill>
-                  </a:tcPr>
-                </a:tc>
               </a:tr>
               <a:tr h="254000">
                 <a:tc>
@@ -6191,25 +5777,6 @@
                     </a:solidFill>
                   </a:tcPr>
                 </a:tc>
-                <a:tc>
-                  <a:txBody>
-                    <a:bodyPr anchorCtr="0"/>
-                    <a:lstStyle/>
-                    <a:p>
-                      <a:r>
-                        <a:rPr sz="1200" dirty="1">
-                          <a:latin typeface="Calibri"/>
-                        </a:rPr>
-                        <a:t>10041</a:t>
-                      </a:r>
-                    </a:p>
-                  </a:txBody>
-                  <a:tcPr>
-                    <a:solidFill>
-                      <a:srgbClr val="FFFFFF"/>
-                    </a:solidFill>
-                  </a:tcPr>
-                </a:tc>
               </a:tr>
               <a:tr h="254000">
                 <a:tc>
@@ -6326,25 +5893,6 @@
                     </a:solidFill>
                   </a:tcPr>
                 </a:tc>
-                <a:tc>
-                  <a:txBody>
-                    <a:bodyPr anchorCtr="0"/>
-                    <a:lstStyle/>
-                    <a:p>
-                      <a:r>
-                        <a:rPr sz="1200" dirty="1">
-                          <a:latin typeface="Calibri"/>
-                        </a:rPr>
-                        <a:t>10110</a:t>
-                      </a:r>
-                    </a:p>
-                  </a:txBody>
-                  <a:tcPr>
-                    <a:solidFill>
-                      <a:srgbClr val="F5F5F5"/>
-                    </a:solidFill>
-                  </a:tcPr>
-                </a:tc>
               </a:tr>
               <a:tr h="254000">
                 <a:tc>
@@ -6461,25 +6009,6 @@
                     </a:solidFill>
                   </a:tcPr>
                 </a:tc>
-                <a:tc>
-                  <a:txBody>
-                    <a:bodyPr anchorCtr="0"/>
-                    <a:lstStyle/>
-                    <a:p>
-                      <a:r>
-                        <a:rPr sz="1200" dirty="1">
-                          <a:latin typeface="Calibri"/>
-                        </a:rPr>
-                        <a:t>10059</a:t>
-                      </a:r>
-                    </a:p>
-                  </a:txBody>
-                  <a:tcPr>
-                    <a:solidFill>
-                      <a:srgbClr val="FFFFFF"/>
-                    </a:solidFill>
-                  </a:tcPr>
-                </a:tc>
               </a:tr>
               <a:tr h="254000">
                 <a:tc>
@@ -6596,25 +6125,6 @@
                     </a:solidFill>
                   </a:tcPr>
                 </a:tc>
-                <a:tc>
-                  <a:txBody>
-                    <a:bodyPr anchorCtr="0"/>
-                    <a:lstStyle/>
-                    <a:p>
-                      <a:r>
-                        <a:rPr sz="1200" dirty="1">
-                          <a:latin typeface="Calibri"/>
-                        </a:rPr>
-                        <a:t>10096</a:t>
-                      </a:r>
-                    </a:p>
-                  </a:txBody>
-                  <a:tcPr>
-                    <a:solidFill>
-                      <a:srgbClr val="F5F5F5"/>
-                    </a:solidFill>
-                  </a:tcPr>
-                </a:tc>
               </a:tr>
               <a:tr h="254000">
                 <a:tc>
@@ -6722,25 +6232,6 @@
                           <a:latin typeface="Calibri"/>
                         </a:rPr>
                         <a:t>Spain</a:t>
-                      </a:r>
-                    </a:p>
-                  </a:txBody>
-                  <a:tcPr>
-                    <a:solidFill>
-                      <a:srgbClr val="FFFFFF"/>
-                    </a:solidFill>
-                  </a:tcPr>
-                </a:tc>
-                <a:tc>
-                  <a:txBody>
-                    <a:bodyPr anchorCtr="0"/>
-                    <a:lstStyle/>
-                    <a:p>
-                      <a:r>
-                        <a:rPr sz="1200" dirty="1">
-                          <a:latin typeface="Calibri"/>
-                        </a:rPr>
-                        <a:t>10080</a:t>
                       </a:r>
                     </a:p>
                   </a:txBody>
@@ -6795,8 +6286,8 @@
           <p:nvPr/>
         </p:nvGraphicFramePr>
         <p:xfrm>
-          <a:off x="1079500" y="1016000"/>
-          <a:ext cx="8890000" cy="4754880"/>
+          <a:off x="762000" y="508000"/>
+          <a:ext cx="7620000" cy="4754880"/>
         </p:xfrm>
         <a:graphic>
           <a:graphicData uri="http://schemas.openxmlformats.org/drawingml/2006/table">
@@ -6811,7 +6302,6 @@
                 <a:gridCol w="1270000"/>
                 <a:gridCol w="1270000"/>
                 <a:gridCol w="1270000"/>
-                <a:gridCol w="1270000"/>
               </a:tblGrid>
               <a:tr h="254000">
                 <a:tc>
@@ -6829,7 +6319,7 @@
                   </a:txBody>
                   <a:tcPr>
                     <a:solidFill>
-                      <a:srgbClr val="FFFFFF"/>
+                      <a:srgbClr val="2980BA"/>
                     </a:solidFill>
                   </a:tcPr>
                 </a:tc>
@@ -6848,7 +6338,7 @@
                   </a:txBody>
                   <a:tcPr>
                     <a:solidFill>
-                      <a:srgbClr val="FFFFFF"/>
+                      <a:srgbClr val="2980BA"/>
                     </a:solidFill>
                   </a:tcPr>
                 </a:tc>
@@ -6867,7 +6357,7 @@
                   </a:txBody>
                   <a:tcPr>
                     <a:solidFill>
-                      <a:srgbClr val="FFFFFF"/>
+                      <a:srgbClr val="2980BA"/>
                     </a:solidFill>
                   </a:tcPr>
                 </a:tc>
@@ -6886,7 +6376,7 @@
                   </a:txBody>
                   <a:tcPr>
                     <a:solidFill>
-                      <a:srgbClr val="FFFFFF"/>
+                      <a:srgbClr val="2980BA"/>
                     </a:solidFill>
                   </a:tcPr>
                 </a:tc>
@@ -6905,7 +6395,7 @@
                   </a:txBody>
                   <a:tcPr>
                     <a:solidFill>
-                      <a:srgbClr val="FFFFFF"/>
+                      <a:srgbClr val="2980BA"/>
                     </a:solidFill>
                   </a:tcPr>
                 </a:tc>
@@ -6924,26 +6414,7 @@
                   </a:txBody>
                   <a:tcPr>
                     <a:solidFill>
-                      <a:srgbClr val="FFFFFF"/>
-                    </a:solidFill>
-                  </a:tcPr>
-                </a:tc>
-                <a:tc>
-                  <a:txBody>
-                    <a:bodyPr anchorCtr="0"/>
-                    <a:lstStyle/>
-                    <a:p>
-                      <a:r>
-                        <a:rPr sz="1200" dirty="1">
-                          <a:latin typeface="Calibri"/>
-                        </a:rPr>
-                        <a:t>Postal Code</a:t>
-                      </a:r>
-                    </a:p>
-                  </a:txBody>
-                  <a:tcPr>
-                    <a:solidFill>
-                      <a:srgbClr val="FFFFFF"/>
+                      <a:srgbClr val="2980BA"/>
                     </a:solidFill>
                   </a:tcPr>
                 </a:tc>
@@ -7063,25 +6534,6 @@
                     </a:solidFill>
                   </a:tcPr>
                 </a:tc>
-                <a:tc>
-                  <a:txBody>
-                    <a:bodyPr anchorCtr="0"/>
-                    <a:lstStyle/>
-                    <a:p>
-                      <a:r>
-                        <a:rPr sz="1200" dirty="1">
-                          <a:latin typeface="Calibri"/>
-                        </a:rPr>
-                        <a:t>10048</a:t>
-                      </a:r>
-                    </a:p>
-                  </a:txBody>
-                  <a:tcPr>
-                    <a:solidFill>
-                      <a:srgbClr val="F5F5F5"/>
-                    </a:solidFill>
-                  </a:tcPr>
-                </a:tc>
               </a:tr>
               <a:tr h="254000">
                 <a:tc>
@@ -7198,25 +6650,6 @@
                     </a:solidFill>
                   </a:tcPr>
                 </a:tc>
-                <a:tc>
-                  <a:txBody>
-                    <a:bodyPr anchorCtr="0"/>
-                    <a:lstStyle/>
-                    <a:p>
-                      <a:r>
-                        <a:rPr sz="1200" dirty="1">
-                          <a:latin typeface="Calibri"/>
-                        </a:rPr>
-                        <a:t>10114</a:t>
-                      </a:r>
-                    </a:p>
-                  </a:txBody>
-                  <a:tcPr>
-                    <a:solidFill>
-                      <a:srgbClr val="FFFFFF"/>
-                    </a:solidFill>
-                  </a:tcPr>
-                </a:tc>
               </a:tr>
               <a:tr h="254000">
                 <a:tc>
@@ -7333,25 +6766,6 @@
                     </a:solidFill>
                   </a:tcPr>
                 </a:tc>
-                <a:tc>
-                  <a:txBody>
-                    <a:bodyPr anchorCtr="0"/>
-                    <a:lstStyle/>
-                    <a:p>
-                      <a:r>
-                        <a:rPr sz="1200" dirty="1">
-                          <a:latin typeface="Calibri"/>
-                        </a:rPr>
-                        <a:t>10091</a:t>
-                      </a:r>
-                    </a:p>
-                  </a:txBody>
-                  <a:tcPr>
-                    <a:solidFill>
-                      <a:srgbClr val="F5F5F5"/>
-                    </a:solidFill>
-                  </a:tcPr>
-                </a:tc>
               </a:tr>
               <a:tr h="254000">
                 <a:tc>
@@ -7468,25 +6882,6 @@
                     </a:solidFill>
                   </a:tcPr>
                 </a:tc>
-                <a:tc>
-                  <a:txBody>
-                    <a:bodyPr anchorCtr="0"/>
-                    <a:lstStyle/>
-                    <a:p>
-                      <a:r>
-                        <a:rPr sz="1200" dirty="1">
-                          <a:latin typeface="Calibri"/>
-                        </a:rPr>
-                        <a:t>10101</a:t>
-                      </a:r>
-                    </a:p>
-                  </a:txBody>
-                  <a:tcPr>
-                    <a:solidFill>
-                      <a:srgbClr val="FFFFFF"/>
-                    </a:solidFill>
-                  </a:tcPr>
-                </a:tc>
               </a:tr>
               <a:tr h="254000">
                 <a:tc>
@@ -7603,25 +6998,6 @@
                     </a:solidFill>
                   </a:tcPr>
                 </a:tc>
-                <a:tc>
-                  <a:txBody>
-                    <a:bodyPr anchorCtr="0"/>
-                    <a:lstStyle/>
-                    <a:p>
-                      <a:r>
-                        <a:rPr sz="1200" dirty="1">
-                          <a:latin typeface="Calibri"/>
-                        </a:rPr>
-                        <a:t>10099</a:t>
-                      </a:r>
-                    </a:p>
-                  </a:txBody>
-                  <a:tcPr>
-                    <a:solidFill>
-                      <a:srgbClr val="F5F5F5"/>
-                    </a:solidFill>
-                  </a:tcPr>
-                </a:tc>
               </a:tr>
               <a:tr h="254000">
                 <a:tc>
@@ -7738,25 +7114,6 @@
                     </a:solidFill>
                   </a:tcPr>
                 </a:tc>
-                <a:tc>
-                  <a:txBody>
-                    <a:bodyPr anchorCtr="0"/>
-                    <a:lstStyle/>
-                    <a:p>
-                      <a:r>
-                        <a:rPr sz="1200" dirty="1">
-                          <a:latin typeface="Calibri"/>
-                        </a:rPr>
-                        <a:t>10054</a:t>
-                      </a:r>
-                    </a:p>
-                  </a:txBody>
-                  <a:tcPr>
-                    <a:solidFill>
-                      <a:srgbClr val="FFFFFF"/>
-                    </a:solidFill>
-                  </a:tcPr>
-                </a:tc>
               </a:tr>
               <a:tr h="254000">
                 <a:tc>
@@ -7873,25 +7230,6 @@
                     </a:solidFill>
                   </a:tcPr>
                 </a:tc>
-                <a:tc>
-                  <a:txBody>
-                    <a:bodyPr anchorCtr="0"/>
-                    <a:lstStyle/>
-                    <a:p>
-                      <a:r>
-                        <a:rPr sz="1200" dirty="1">
-                          <a:latin typeface="Calibri"/>
-                        </a:rPr>
-                        <a:t>10081</a:t>
-                      </a:r>
-                    </a:p>
-                  </a:txBody>
-                  <a:tcPr>
-                    <a:solidFill>
-                      <a:srgbClr val="F5F5F5"/>
-                    </a:solidFill>
-                  </a:tcPr>
-                </a:tc>
               </a:tr>
               <a:tr h="254000">
                 <a:tc>
@@ -8008,25 +7346,6 @@
                     </a:solidFill>
                   </a:tcPr>
                 </a:tc>
-                <a:tc>
-                  <a:txBody>
-                    <a:bodyPr anchorCtr="0"/>
-                    <a:lstStyle/>
-                    <a:p>
-                      <a:r>
-                        <a:rPr sz="1200" dirty="1">
-                          <a:latin typeface="Calibri"/>
-                        </a:rPr>
-                        <a:t>10075</a:t>
-                      </a:r>
-                    </a:p>
-                  </a:txBody>
-                  <a:tcPr>
-                    <a:solidFill>
-                      <a:srgbClr val="FFFFFF"/>
-                    </a:solidFill>
-                  </a:tcPr>
-                </a:tc>
               </a:tr>
               <a:tr h="254000">
                 <a:tc>
@@ -8143,25 +7462,6 @@
                     </a:solidFill>
                   </a:tcPr>
                 </a:tc>
-                <a:tc>
-                  <a:txBody>
-                    <a:bodyPr anchorCtr="0"/>
-                    <a:lstStyle/>
-                    <a:p>
-                      <a:r>
-                        <a:rPr sz="1200" dirty="1">
-                          <a:latin typeface="Calibri"/>
-                        </a:rPr>
-                        <a:t>10128</a:t>
-                      </a:r>
-                    </a:p>
-                  </a:txBody>
-                  <a:tcPr>
-                    <a:solidFill>
-                      <a:srgbClr val="F5F5F5"/>
-                    </a:solidFill>
-                  </a:tcPr>
-                </a:tc>
               </a:tr>
               <a:tr h="254000">
                 <a:tc>
@@ -8278,25 +7578,6 @@
                     </a:solidFill>
                   </a:tcPr>
                 </a:tc>
-                <a:tc>
-                  <a:txBody>
-                    <a:bodyPr anchorCtr="0"/>
-                    <a:lstStyle/>
-                    <a:p>
-                      <a:r>
-                        <a:rPr sz="1200" dirty="1">
-                          <a:latin typeface="Calibri"/>
-                        </a:rPr>
-                        <a:t>10070</a:t>
-                      </a:r>
-                    </a:p>
-                  </a:txBody>
-                  <a:tcPr>
-                    <a:solidFill>
-                      <a:srgbClr val="FFFFFF"/>
-                    </a:solidFill>
-                  </a:tcPr>
-                </a:tc>
               </a:tr>
               <a:tr h="254000">
                 <a:tc>
@@ -8404,25 +7685,6 @@
                           <a:latin typeface="Calibri"/>
                         </a:rPr>
                         <a:t>Venezuela</a:t>
-                      </a:r>
-                    </a:p>
-                  </a:txBody>
-                  <a:tcPr>
-                    <a:solidFill>
-                      <a:srgbClr val="F5F5F5"/>
-                    </a:solidFill>
-                  </a:tcPr>
-                </a:tc>
-                <a:tc>
-                  <a:txBody>
-                    <a:bodyPr anchorCtr="0"/>
-                    <a:lstStyle/>
-                    <a:p>
-                      <a:r>
-                        <a:rPr sz="1200" dirty="1">
-                          <a:latin typeface="Calibri"/>
-                        </a:rPr>
-                        <a:t>10043</a:t>
                       </a:r>
                     </a:p>
                   </a:txBody>
@@ -8477,8 +7739,8 @@
           <p:nvPr/>
         </p:nvGraphicFramePr>
         <p:xfrm>
-          <a:off x="1079500" y="1016000"/>
-          <a:ext cx="8890000" cy="5486400"/>
+          <a:off x="762000" y="508000"/>
+          <a:ext cx="7620000" cy="5486400"/>
         </p:xfrm>
         <a:graphic>
           <a:graphicData uri="http://schemas.openxmlformats.org/drawingml/2006/table">
@@ -8493,7 +7755,6 @@
                 <a:gridCol w="1270000"/>
                 <a:gridCol w="1270000"/>
                 <a:gridCol w="1270000"/>
-                <a:gridCol w="1270000"/>
               </a:tblGrid>
               <a:tr h="254000">
                 <a:tc>
@@ -8511,7 +7772,7 @@
                   </a:txBody>
                   <a:tcPr>
                     <a:solidFill>
-                      <a:srgbClr val="FFFFFF"/>
+                      <a:srgbClr val="2980BA"/>
                     </a:solidFill>
                   </a:tcPr>
                 </a:tc>
@@ -8530,7 +7791,7 @@
                   </a:txBody>
                   <a:tcPr>
                     <a:solidFill>
-                      <a:srgbClr val="FFFFFF"/>
+                      <a:srgbClr val="2980BA"/>
                     </a:solidFill>
                   </a:tcPr>
                 </a:tc>
@@ -8549,7 +7810,7 @@
                   </a:txBody>
                   <a:tcPr>
                     <a:solidFill>
-                      <a:srgbClr val="FFFFFF"/>
+                      <a:srgbClr val="2980BA"/>
                     </a:solidFill>
                   </a:tcPr>
                 </a:tc>
@@ -8568,7 +7829,7 @@
                   </a:txBody>
                   <a:tcPr>
                     <a:solidFill>
-                      <a:srgbClr val="FFFFFF"/>
+                      <a:srgbClr val="2980BA"/>
                     </a:solidFill>
                   </a:tcPr>
                 </a:tc>
@@ -8587,7 +7848,7 @@
                   </a:txBody>
                   <a:tcPr>
                     <a:solidFill>
-                      <a:srgbClr val="FFFFFF"/>
+                      <a:srgbClr val="2980BA"/>
                     </a:solidFill>
                   </a:tcPr>
                 </a:tc>
@@ -8606,26 +7867,7 @@
                   </a:txBody>
                   <a:tcPr>
                     <a:solidFill>
-                      <a:srgbClr val="FFFFFF"/>
-                    </a:solidFill>
-                  </a:tcPr>
-                </a:tc>
-                <a:tc>
-                  <a:txBody>
-                    <a:bodyPr anchorCtr="0"/>
-                    <a:lstStyle/>
-                    <a:p>
-                      <a:r>
-                        <a:rPr sz="1200" dirty="1">
-                          <a:latin typeface="Calibri"/>
-                        </a:rPr>
-                        <a:t>Postal Code</a:t>
-                      </a:r>
-                    </a:p>
-                  </a:txBody>
-                  <a:tcPr>
-                    <a:solidFill>
-                      <a:srgbClr val="FFFFFF"/>
+                      <a:srgbClr val="2980BA"/>
                     </a:solidFill>
                   </a:tcPr>
                 </a:tc>
@@ -8745,25 +7987,6 @@
                     </a:solidFill>
                   </a:tcPr>
                 </a:tc>
-                <a:tc>
-                  <a:txBody>
-                    <a:bodyPr anchorCtr="0"/>
-                    <a:lstStyle/>
-                    <a:p>
-                      <a:r>
-                        <a:rPr sz="1200" dirty="1">
-                          <a:latin typeface="Calibri"/>
-                        </a:rPr>
-                        <a:t>10076</a:t>
-                      </a:r>
-                    </a:p>
-                  </a:txBody>
-                  <a:tcPr>
-                    <a:solidFill>
-                      <a:srgbClr val="FFFFFF"/>
-                    </a:solidFill>
-                  </a:tcPr>
-                </a:tc>
               </a:tr>
               <a:tr h="254000">
                 <a:tc>
@@ -8880,25 +8103,6 @@
                     </a:solidFill>
                   </a:tcPr>
                 </a:tc>
-                <a:tc>
-                  <a:txBody>
-                    <a:bodyPr anchorCtr="0"/>
-                    <a:lstStyle/>
-                    <a:p>
-                      <a:r>
-                        <a:rPr sz="1200" dirty="1">
-                          <a:latin typeface="Calibri"/>
-                        </a:rPr>
-                        <a:t>10066</a:t>
-                      </a:r>
-                    </a:p>
-                  </a:txBody>
-                  <a:tcPr>
-                    <a:solidFill>
-                      <a:srgbClr val="F5F5F5"/>
-                    </a:solidFill>
-                  </a:tcPr>
-                </a:tc>
               </a:tr>
               <a:tr h="254000">
                 <a:tc>
@@ -9015,25 +8219,6 @@
                     </a:solidFill>
                   </a:tcPr>
                 </a:tc>
-                <a:tc>
-                  <a:txBody>
-                    <a:bodyPr anchorCtr="0"/>
-                    <a:lstStyle/>
-                    <a:p>
-                      <a:r>
-                        <a:rPr sz="1200" dirty="1">
-                          <a:latin typeface="Calibri"/>
-                        </a:rPr>
-                        <a:t>10103</a:t>
-                      </a:r>
-                    </a:p>
-                  </a:txBody>
-                  <a:tcPr>
-                    <a:solidFill>
-                      <a:srgbClr val="FFFFFF"/>
-                    </a:solidFill>
-                  </a:tcPr>
-                </a:tc>
               </a:tr>
               <a:tr h="254000">
                 <a:tc>
@@ -9150,25 +8335,6 @@
                     </a:solidFill>
                   </a:tcPr>
                 </a:tc>
-                <a:tc>
-                  <a:txBody>
-                    <a:bodyPr anchorCtr="0"/>
-                    <a:lstStyle/>
-                    <a:p>
-                      <a:r>
-                        <a:rPr sz="1200" dirty="1">
-                          <a:latin typeface="Calibri"/>
-                        </a:rPr>
-                        <a:t>10051</a:t>
-                      </a:r>
-                    </a:p>
-                  </a:txBody>
-                  <a:tcPr>
-                    <a:solidFill>
-                      <a:srgbClr val="F5F5F5"/>
-                    </a:solidFill>
-                  </a:tcPr>
-                </a:tc>
               </a:tr>
               <a:tr h="254000">
                 <a:tc>
@@ -9285,25 +8451,6 @@
                     </a:solidFill>
                   </a:tcPr>
                 </a:tc>
-                <a:tc>
-                  <a:txBody>
-                    <a:bodyPr anchorCtr="0"/>
-                    <a:lstStyle/>
-                    <a:p>
-                      <a:r>
-                        <a:rPr sz="1200" dirty="1">
-                          <a:latin typeface="Calibri"/>
-                        </a:rPr>
-                        <a:t>10063</a:t>
-                      </a:r>
-                    </a:p>
-                  </a:txBody>
-                  <a:tcPr>
-                    <a:solidFill>
-                      <a:srgbClr val="FFFFFF"/>
-                    </a:solidFill>
-                  </a:tcPr>
-                </a:tc>
               </a:tr>
               <a:tr h="254000">
                 <a:tc>
@@ -9420,25 +8567,6 @@
                     </a:solidFill>
                   </a:tcPr>
                 </a:tc>
-                <a:tc>
-                  <a:txBody>
-                    <a:bodyPr anchorCtr="0"/>
-                    <a:lstStyle/>
-                    <a:p>
-                      <a:r>
-                        <a:rPr sz="1200" dirty="1">
-                          <a:latin typeface="Calibri"/>
-                        </a:rPr>
-                        <a:t>10060</a:t>
-                      </a:r>
-                    </a:p>
-                  </a:txBody>
-                  <a:tcPr>
-                    <a:solidFill>
-                      <a:srgbClr val="F5F5F5"/>
-                    </a:solidFill>
-                  </a:tcPr>
-                </a:tc>
               </a:tr>
               <a:tr h="254000">
                 <a:tc>
@@ -9555,25 +8683,6 @@
                     </a:solidFill>
                   </a:tcPr>
                 </a:tc>
-                <a:tc>
-                  <a:txBody>
-                    <a:bodyPr anchorCtr="0"/>
-                    <a:lstStyle/>
-                    <a:p>
-                      <a:r>
-                        <a:rPr sz="1200" dirty="1">
-                          <a:latin typeface="Calibri"/>
-                        </a:rPr>
-                        <a:t>10108</a:t>
-                      </a:r>
-                    </a:p>
-                  </a:txBody>
-                  <a:tcPr>
-                    <a:solidFill>
-                      <a:srgbClr val="FFFFFF"/>
-                    </a:solidFill>
-                  </a:tcPr>
-                </a:tc>
               </a:tr>
               <a:tr h="254000">
                 <a:tc>
@@ -9690,25 +8799,6 @@
                     </a:solidFill>
                   </a:tcPr>
                 </a:tc>
-                <a:tc>
-                  <a:txBody>
-                    <a:bodyPr anchorCtr="0"/>
-                    <a:lstStyle/>
-                    <a:p>
-                      <a:r>
-                        <a:rPr sz="1200" dirty="1">
-                          <a:latin typeface="Calibri"/>
-                        </a:rPr>
-                        <a:t>10053</a:t>
-                      </a:r>
-                    </a:p>
-                  </a:txBody>
-                  <a:tcPr>
-                    <a:solidFill>
-                      <a:srgbClr val="F5F5F5"/>
-                    </a:solidFill>
-                  </a:tcPr>
-                </a:tc>
               </a:tr>
               <a:tr h="254000">
                 <a:tc>
@@ -9825,25 +8915,6 @@
                     </a:solidFill>
                   </a:tcPr>
                 </a:tc>
-                <a:tc>
-                  <a:txBody>
-                    <a:bodyPr anchorCtr="0"/>
-                    <a:lstStyle/>
-                    <a:p>
-                      <a:r>
-                        <a:rPr sz="1200" dirty="1">
-                          <a:latin typeface="Calibri"/>
-                        </a:rPr>
-                        <a:t>10098</a:t>
-                      </a:r>
-                    </a:p>
-                  </a:txBody>
-                  <a:tcPr>
-                    <a:solidFill>
-                      <a:srgbClr val="FFFFFF"/>
-                    </a:solidFill>
-                  </a:tcPr>
-                </a:tc>
               </a:tr>
               <a:tr h="254000">
                 <a:tc>
@@ -9960,25 +9031,6 @@
                     </a:solidFill>
                   </a:tcPr>
                 </a:tc>
-                <a:tc>
-                  <a:txBody>
-                    <a:bodyPr anchorCtr="0"/>
-                    <a:lstStyle/>
-                    <a:p>
-                      <a:r>
-                        <a:rPr sz="1200" dirty="1">
-                          <a:latin typeface="Calibri"/>
-                        </a:rPr>
-                        <a:t>10069</a:t>
-                      </a:r>
-                    </a:p>
-                  </a:txBody>
-                  <a:tcPr>
-                    <a:solidFill>
-                      <a:srgbClr val="F5F5F5"/>
-                    </a:solidFill>
-                  </a:tcPr>
-                </a:tc>
               </a:tr>
               <a:tr h="254000">
                 <a:tc>
@@ -10086,25 +9138,6 @@
                           <a:latin typeface="Calibri"/>
                         </a:rPr>
                         <a:t>Germany</a:t>
-                      </a:r>
-                    </a:p>
-                  </a:txBody>
-                  <a:tcPr>
-                    <a:solidFill>
-                      <a:srgbClr val="FFFFFF"/>
-                    </a:solidFill>
-                  </a:tcPr>
-                </a:tc>
-                <a:tc>
-                  <a:txBody>
-                    <a:bodyPr anchorCtr="0"/>
-                    <a:lstStyle/>
-                    <a:p>
-                      <a:r>
-                        <a:rPr sz="1200" dirty="1">
-                          <a:latin typeface="Calibri"/>
-                        </a:rPr>
-                        <a:t>10095</a:t>
                       </a:r>
                     </a:p>
                   </a:txBody>
@@ -10159,8 +9192,8 @@
           <p:nvPr/>
         </p:nvGraphicFramePr>
         <p:xfrm>
-          <a:off x="1079500" y="1016000"/>
-          <a:ext cx="8890000" cy="5852160"/>
+          <a:off x="762000" y="508000"/>
+          <a:ext cx="7620000" cy="5852160"/>
         </p:xfrm>
         <a:graphic>
           <a:graphicData uri="http://schemas.openxmlformats.org/drawingml/2006/table">
@@ -10175,7 +9208,6 @@
                 <a:gridCol w="1270000"/>
                 <a:gridCol w="1270000"/>
                 <a:gridCol w="1270000"/>
-                <a:gridCol w="1270000"/>
               </a:tblGrid>
               <a:tr h="254000">
                 <a:tc>
@@ -10193,7 +9225,7 @@
                   </a:txBody>
                   <a:tcPr>
                     <a:solidFill>
-                      <a:srgbClr val="FFFFFF"/>
+                      <a:srgbClr val="2980BA"/>
                     </a:solidFill>
                   </a:tcPr>
                 </a:tc>
@@ -10212,7 +9244,7 @@
                   </a:txBody>
                   <a:tcPr>
                     <a:solidFill>
-                      <a:srgbClr val="FFFFFF"/>
+                      <a:srgbClr val="2980BA"/>
                     </a:solidFill>
                   </a:tcPr>
                 </a:tc>
@@ -10231,7 +9263,7 @@
                   </a:txBody>
                   <a:tcPr>
                     <a:solidFill>
-                      <a:srgbClr val="FFFFFF"/>
+                      <a:srgbClr val="2980BA"/>
                     </a:solidFill>
                   </a:tcPr>
                 </a:tc>
@@ -10250,7 +9282,7 @@
                   </a:txBody>
                   <a:tcPr>
                     <a:solidFill>
-                      <a:srgbClr val="FFFFFF"/>
+                      <a:srgbClr val="2980BA"/>
                     </a:solidFill>
                   </a:tcPr>
                 </a:tc>
@@ -10269,7 +9301,7 @@
                   </a:txBody>
                   <a:tcPr>
                     <a:solidFill>
-                      <a:srgbClr val="FFFFFF"/>
+                      <a:srgbClr val="2980BA"/>
                     </a:solidFill>
                   </a:tcPr>
                 </a:tc>
@@ -10288,26 +9320,7 @@
                   </a:txBody>
                   <a:tcPr>
                     <a:solidFill>
-                      <a:srgbClr val="FFFFFF"/>
-                    </a:solidFill>
-                  </a:tcPr>
-                </a:tc>
-                <a:tc>
-                  <a:txBody>
-                    <a:bodyPr anchorCtr="0"/>
-                    <a:lstStyle/>
-                    <a:p>
-                      <a:r>
-                        <a:rPr sz="1200" dirty="1">
-                          <a:latin typeface="Calibri"/>
-                        </a:rPr>
-                        <a:t>Postal Code</a:t>
-                      </a:r>
-                    </a:p>
-                  </a:txBody>
-                  <a:tcPr>
-                    <a:solidFill>
-                      <a:srgbClr val="FFFFFF"/>
+                      <a:srgbClr val="2980BA"/>
                     </a:solidFill>
                   </a:tcPr>
                 </a:tc>
@@ -10427,25 +9440,6 @@
                     </a:solidFill>
                   </a:tcPr>
                 </a:tc>
-                <a:tc>
-                  <a:txBody>
-                    <a:bodyPr anchorCtr="0"/>
-                    <a:lstStyle/>
-                    <a:p>
-                      <a:r>
-                        <a:rPr sz="1200" dirty="1">
-                          <a:latin typeface="Calibri"/>
-                        </a:rPr>
-                        <a:t>10062</a:t>
-                      </a:r>
-                    </a:p>
-                  </a:txBody>
-                  <a:tcPr>
-                    <a:solidFill>
-                      <a:srgbClr val="F5F5F5"/>
-                    </a:solidFill>
-                  </a:tcPr>
-                </a:tc>
               </a:tr>
               <a:tr h="254000">
                 <a:tc>
@@ -10562,25 +9556,6 @@
                     </a:solidFill>
                   </a:tcPr>
                 </a:tc>
-                <a:tc>
-                  <a:txBody>
-                    <a:bodyPr anchorCtr="0"/>
-                    <a:lstStyle/>
-                    <a:p>
-                      <a:r>
-                        <a:rPr sz="1200" dirty="1">
-                          <a:latin typeface="Calibri"/>
-                        </a:rPr>
-                        <a:t>10093</a:t>
-                      </a:r>
-                    </a:p>
-                  </a:txBody>
-                  <a:tcPr>
-                    <a:solidFill>
-                      <a:srgbClr val="FFFFFF"/>
-                    </a:solidFill>
-                  </a:tcPr>
-                </a:tc>
               </a:tr>
               <a:tr h="254000">
                 <a:tc>
@@ -10697,25 +9672,6 @@
                     </a:solidFill>
                   </a:tcPr>
                 </a:tc>
-                <a:tc>
-                  <a:txBody>
-                    <a:bodyPr anchorCtr="0"/>
-                    <a:lstStyle/>
-                    <a:p>
-                      <a:r>
-                        <a:rPr sz="1200" dirty="1">
-                          <a:latin typeface="Calibri"/>
-                        </a:rPr>
-                        <a:t>10121</a:t>
-                      </a:r>
-                    </a:p>
-                  </a:txBody>
-                  <a:tcPr>
-                    <a:solidFill>
-                      <a:srgbClr val="F5F5F5"/>
-                    </a:solidFill>
-                  </a:tcPr>
-                </a:tc>
               </a:tr>
               <a:tr h="254000">
                 <a:tc>
@@ -10832,25 +9788,6 @@
                     </a:solidFill>
                   </a:tcPr>
                 </a:tc>
-                <a:tc>
-                  <a:txBody>
-                    <a:bodyPr anchorCtr="0"/>
-                    <a:lstStyle/>
-                    <a:p>
-                      <a:r>
-                        <a:rPr sz="1200" dirty="1">
-                          <a:latin typeface="Calibri"/>
-                        </a:rPr>
-                        <a:t>10073</a:t>
-                      </a:r>
-                    </a:p>
-                  </a:txBody>
-                  <a:tcPr>
-                    <a:solidFill>
-                      <a:srgbClr val="FFFFFF"/>
-                    </a:solidFill>
-                  </a:tcPr>
-                </a:tc>
               </a:tr>
               <a:tr h="254000">
                 <a:tc>
@@ -10967,25 +9904,6 @@
                     </a:solidFill>
                   </a:tcPr>
                 </a:tc>
-                <a:tc>
-                  <a:txBody>
-                    <a:bodyPr anchorCtr="0"/>
-                    <a:lstStyle/>
-                    <a:p>
-                      <a:r>
-                        <a:rPr sz="1200" dirty="1">
-                          <a:latin typeface="Calibri"/>
-                        </a:rPr>
-                        <a:t>10106</a:t>
-                      </a:r>
-                    </a:p>
-                  </a:txBody>
-                  <a:tcPr>
-                    <a:solidFill>
-                      <a:srgbClr val="F5F5F5"/>
-                    </a:solidFill>
-                  </a:tcPr>
-                </a:tc>
               </a:tr>
               <a:tr h="254000">
                 <a:tc>
@@ -11102,25 +10020,6 @@
                     </a:solidFill>
                   </a:tcPr>
                 </a:tc>
-                <a:tc>
-                  <a:txBody>
-                    <a:bodyPr anchorCtr="0"/>
-                    <a:lstStyle/>
-                    <a:p>
-                      <a:r>
-                        <a:rPr sz="1200" dirty="1">
-                          <a:latin typeface="Calibri"/>
-                        </a:rPr>
-                        <a:t>10074</a:t>
-                      </a:r>
-                    </a:p>
-                  </a:txBody>
-                  <a:tcPr>
-                    <a:solidFill>
-                      <a:srgbClr val="FFFFFF"/>
-                    </a:solidFill>
-                  </a:tcPr>
-                </a:tc>
               </a:tr>
               <a:tr h="254000">
                 <a:tc>
@@ -11237,25 +10136,6 @@
                     </a:solidFill>
                   </a:tcPr>
                 </a:tc>
-                <a:tc>
-                  <a:txBody>
-                    <a:bodyPr anchorCtr="0"/>
-                    <a:lstStyle/>
-                    <a:p>
-                      <a:r>
-                        <a:rPr sz="1200" dirty="1">
-                          <a:latin typeface="Calibri"/>
-                        </a:rPr>
-                        <a:t>10040</a:t>
-                      </a:r>
-                    </a:p>
-                  </a:txBody>
-                  <a:tcPr>
-                    <a:solidFill>
-                      <a:srgbClr val="F5F5F5"/>
-                    </a:solidFill>
-                  </a:tcPr>
-                </a:tc>
               </a:tr>
               <a:tr h="254000">
                 <a:tc>
@@ -11372,25 +10252,6 @@
                     </a:solidFill>
                   </a:tcPr>
                 </a:tc>
-                <a:tc>
-                  <a:txBody>
-                    <a:bodyPr anchorCtr="0"/>
-                    <a:lstStyle/>
-                    <a:p>
-                      <a:r>
-                        <a:rPr sz="1200" dirty="1">
-                          <a:latin typeface="Calibri"/>
-                        </a:rPr>
-                        <a:t>10125</a:t>
-                      </a:r>
-                    </a:p>
-                  </a:txBody>
-                  <a:tcPr>
-                    <a:solidFill>
-                      <a:srgbClr val="FFFFFF"/>
-                    </a:solidFill>
-                  </a:tcPr>
-                </a:tc>
               </a:tr>
               <a:tr h="254000">
                 <a:tc>
@@ -11507,25 +10368,6 @@
                     </a:solidFill>
                   </a:tcPr>
                 </a:tc>
-                <a:tc>
-                  <a:txBody>
-                    <a:bodyPr anchorCtr="0"/>
-                    <a:lstStyle/>
-                    <a:p>
-                      <a:r>
-                        <a:rPr sz="1200" dirty="1">
-                          <a:latin typeface="Calibri"/>
-                        </a:rPr>
-                        <a:t>10061</a:t>
-                      </a:r>
-                    </a:p>
-                  </a:txBody>
-                  <a:tcPr>
-                    <a:solidFill>
-                      <a:srgbClr val="F5F5F5"/>
-                    </a:solidFill>
-                  </a:tcPr>
-                </a:tc>
               </a:tr>
               <a:tr h="254000">
                 <a:tc>
@@ -11642,25 +10484,6 @@
                     </a:solidFill>
                   </a:tcPr>
                 </a:tc>
-                <a:tc>
-                  <a:txBody>
-                    <a:bodyPr anchorCtr="0"/>
-                    <a:lstStyle/>
-                    <a:p>
-                      <a:r>
-                        <a:rPr sz="1200" dirty="1">
-                          <a:latin typeface="Calibri"/>
-                        </a:rPr>
-                        <a:t>10094</a:t>
-                      </a:r>
-                    </a:p>
-                  </a:txBody>
-                  <a:tcPr>
-                    <a:solidFill>
-                      <a:srgbClr val="FFFFFF"/>
-                    </a:solidFill>
-                  </a:tcPr>
-                </a:tc>
               </a:tr>
               <a:tr h="254000">
                 <a:tc>
@@ -11768,25 +10591,6 @@
                           <a:latin typeface="Calibri"/>
                         </a:rPr>
                         <a:t>USA</a:t>
-                      </a:r>
-                    </a:p>
-                  </a:txBody>
-                  <a:tcPr>
-                    <a:solidFill>
-                      <a:srgbClr val="F5F5F5"/>
-                    </a:solidFill>
-                  </a:tcPr>
-                </a:tc>
-                <a:tc>
-                  <a:txBody>
-                    <a:bodyPr anchorCtr="0"/>
-                    <a:lstStyle/>
-                    <a:p>
-                      <a:r>
-                        <a:rPr sz="1200" dirty="1">
-                          <a:latin typeface="Calibri"/>
-                        </a:rPr>
-                        <a:t>10050</a:t>
                       </a:r>
                     </a:p>
                   </a:txBody>
@@ -11841,8 +10645,8 @@
           <p:nvPr/>
         </p:nvGraphicFramePr>
         <p:xfrm>
-          <a:off x="1079500" y="1016000"/>
-          <a:ext cx="8890000" cy="5303520"/>
+          <a:off x="762000" y="508000"/>
+          <a:ext cx="7620000" cy="5303520"/>
         </p:xfrm>
         <a:graphic>
           <a:graphicData uri="http://schemas.openxmlformats.org/drawingml/2006/table">
@@ -11857,7 +10661,6 @@
                 <a:gridCol w="1270000"/>
                 <a:gridCol w="1270000"/>
                 <a:gridCol w="1270000"/>
-                <a:gridCol w="1270000"/>
               </a:tblGrid>
               <a:tr h="254000">
                 <a:tc>
@@ -11875,7 +10678,7 @@
                   </a:txBody>
                   <a:tcPr>
                     <a:solidFill>
-                      <a:srgbClr val="FFFFFF"/>
+                      <a:srgbClr val="2980BA"/>
                     </a:solidFill>
                   </a:tcPr>
                 </a:tc>
@@ -11894,7 +10697,7 @@
                   </a:txBody>
                   <a:tcPr>
                     <a:solidFill>
-                      <a:srgbClr val="FFFFFF"/>
+                      <a:srgbClr val="2980BA"/>
                     </a:solidFill>
                   </a:tcPr>
                 </a:tc>
@@ -11913,7 +10716,7 @@
                   </a:txBody>
                   <a:tcPr>
                     <a:solidFill>
-                      <a:srgbClr val="FFFFFF"/>
+                      <a:srgbClr val="2980BA"/>
                     </a:solidFill>
                   </a:tcPr>
                 </a:tc>
@@ -11932,7 +10735,7 @@
                   </a:txBody>
                   <a:tcPr>
                     <a:solidFill>
-                      <a:srgbClr val="FFFFFF"/>
+                      <a:srgbClr val="2980BA"/>
                     </a:solidFill>
                   </a:tcPr>
                 </a:tc>
@@ -11951,7 +10754,7 @@
                   </a:txBody>
                   <a:tcPr>
                     <a:solidFill>
-                      <a:srgbClr val="FFFFFF"/>
+                      <a:srgbClr val="2980BA"/>
                     </a:solidFill>
                   </a:tcPr>
                 </a:tc>
@@ -11970,26 +10773,7 @@
                   </a:txBody>
                   <a:tcPr>
                     <a:solidFill>
-                      <a:srgbClr val="FFFFFF"/>
-                    </a:solidFill>
-                  </a:tcPr>
-                </a:tc>
-                <a:tc>
-                  <a:txBody>
-                    <a:bodyPr anchorCtr="0"/>
-                    <a:lstStyle/>
-                    <a:p>
-                      <a:r>
-                        <a:rPr sz="1200" dirty="1">
-                          <a:latin typeface="Calibri"/>
-                        </a:rPr>
-                        <a:t>Postal Code</a:t>
-                      </a:r>
-                    </a:p>
-                  </a:txBody>
-                  <a:tcPr>
-                    <a:solidFill>
-                      <a:srgbClr val="FFFFFF"/>
+                      <a:srgbClr val="2980BA"/>
                     </a:solidFill>
                   </a:tcPr>
                 </a:tc>
@@ -12109,25 +10893,6 @@
                     </a:solidFill>
                   </a:tcPr>
                 </a:tc>
-                <a:tc>
-                  <a:txBody>
-                    <a:bodyPr anchorCtr="0"/>
-                    <a:lstStyle/>
-                    <a:p>
-                      <a:r>
-                        <a:rPr sz="1200" dirty="1">
-                          <a:latin typeface="Calibri"/>
-                        </a:rPr>
-                        <a:t>10047</a:t>
-                      </a:r>
-                    </a:p>
-                  </a:txBody>
-                  <a:tcPr>
-                    <a:solidFill>
-                      <a:srgbClr val="FFFFFF"/>
-                    </a:solidFill>
-                  </a:tcPr>
-                </a:tc>
               </a:tr>
               <a:tr h="254000">
                 <a:tc>
@@ -12244,25 +11009,6 @@
                     </a:solidFill>
                   </a:tcPr>
                 </a:tc>
-                <a:tc>
-                  <a:txBody>
-                    <a:bodyPr anchorCtr="0"/>
-                    <a:lstStyle/>
-                    <a:p>
-                      <a:r>
-                        <a:rPr sz="1200" dirty="1">
-                          <a:latin typeface="Calibri"/>
-                        </a:rPr>
-                        <a:t>10085</a:t>
-                      </a:r>
-                    </a:p>
-                  </a:txBody>
-                  <a:tcPr>
-                    <a:solidFill>
-                      <a:srgbClr val="F5F5F5"/>
-                    </a:solidFill>
-                  </a:tcPr>
-                </a:tc>
               </a:tr>
               <a:tr h="254000">
                 <a:tc>
@@ -12379,25 +11125,6 @@
                     </a:solidFill>
                   </a:tcPr>
                 </a:tc>
-                <a:tc>
-                  <a:txBody>
-                    <a:bodyPr anchorCtr="0"/>
-                    <a:lstStyle/>
-                    <a:p>
-                      <a:r>
-                        <a:rPr sz="1200" dirty="1">
-                          <a:latin typeface="Calibri"/>
-                        </a:rPr>
-                        <a:t>10116</a:t>
-                      </a:r>
-                    </a:p>
-                  </a:txBody>
-                  <a:tcPr>
-                    <a:solidFill>
-                      <a:srgbClr val="FFFFFF"/>
-                    </a:solidFill>
-                  </a:tcPr>
-                </a:tc>
               </a:tr>
               <a:tr h="254000">
                 <a:tc>
@@ -12514,25 +11241,6 @@
                     </a:solidFill>
                   </a:tcPr>
                 </a:tc>
-                <a:tc>
-                  <a:txBody>
-                    <a:bodyPr anchorCtr="0"/>
-                    <a:lstStyle/>
-                    <a:p>
-                      <a:r>
-                        <a:rPr sz="1200" dirty="1">
-                          <a:latin typeface="Calibri"/>
-                        </a:rPr>
-                        <a:t>10127</a:t>
-                      </a:r>
-                    </a:p>
-                  </a:txBody>
-                  <a:tcPr>
-                    <a:solidFill>
-                      <a:srgbClr val="F5F5F5"/>
-                    </a:solidFill>
-                  </a:tcPr>
-                </a:tc>
               </a:tr>
               <a:tr h="254000">
                 <a:tc>
@@ -12649,25 +11357,6 @@
                     </a:solidFill>
                   </a:tcPr>
                 </a:tc>
-                <a:tc>
-                  <a:txBody>
-                    <a:bodyPr anchorCtr="0"/>
-                    <a:lstStyle/>
-                    <a:p>
-                      <a:r>
-                        <a:rPr sz="1200" dirty="1">
-                          <a:latin typeface="Calibri"/>
-                        </a:rPr>
-                        <a:t>10083</a:t>
-                      </a:r>
-                    </a:p>
-                  </a:txBody>
-                  <a:tcPr>
-                    <a:solidFill>
-                      <a:srgbClr val="FFFFFF"/>
-                    </a:solidFill>
-                  </a:tcPr>
-                </a:tc>
               </a:tr>
               <a:tr h="254000">
                 <a:tc>
@@ -12784,25 +11473,6 @@
                     </a:solidFill>
                   </a:tcPr>
                 </a:tc>
-                <a:tc>
-                  <a:txBody>
-                    <a:bodyPr anchorCtr="0"/>
-                    <a:lstStyle/>
-                    <a:p>
-                      <a:r>
-                        <a:rPr sz="1200" dirty="1">
-                          <a:latin typeface="Calibri"/>
-                        </a:rPr>
-                        <a:t>10115</a:t>
-                      </a:r>
-                    </a:p>
-                  </a:txBody>
-                  <a:tcPr>
-                    <a:solidFill>
-                      <a:srgbClr val="F5F5F5"/>
-                    </a:solidFill>
-                  </a:tcPr>
-                </a:tc>
               </a:tr>
               <a:tr h="254000">
                 <a:tc>
@@ -12919,25 +11589,6 @@
                     </a:solidFill>
                   </a:tcPr>
                 </a:tc>
-                <a:tc>
-                  <a:txBody>
-                    <a:bodyPr anchorCtr="0"/>
-                    <a:lstStyle/>
-                    <a:p>
-                      <a:r>
-                        <a:rPr sz="1200" dirty="1">
-                          <a:latin typeface="Calibri"/>
-                        </a:rPr>
-                        <a:t>10102</a:t>
-                      </a:r>
-                    </a:p>
-                  </a:txBody>
-                  <a:tcPr>
-                    <a:solidFill>
-                      <a:srgbClr val="FFFFFF"/>
-                    </a:solidFill>
-                  </a:tcPr>
-                </a:tc>
               </a:tr>
               <a:tr h="254000">
                 <a:tc>
@@ -13054,25 +11705,6 @@
                     </a:solidFill>
                   </a:tcPr>
                 </a:tc>
-                <a:tc>
-                  <a:txBody>
-                    <a:bodyPr anchorCtr="0"/>
-                    <a:lstStyle/>
-                    <a:p>
-                      <a:r>
-                        <a:rPr sz="1200" dirty="1">
-                          <a:latin typeface="Calibri"/>
-                        </a:rPr>
-                        <a:t>10126</a:t>
-                      </a:r>
-                    </a:p>
-                  </a:txBody>
-                  <a:tcPr>
-                    <a:solidFill>
-                      <a:srgbClr val="F5F5F5"/>
-                    </a:solidFill>
-                  </a:tcPr>
-                </a:tc>
               </a:tr>
               <a:tr h="254000">
                 <a:tc>
@@ -13189,25 +11821,6 @@
                     </a:solidFill>
                   </a:tcPr>
                 </a:tc>
-                <a:tc>
-                  <a:txBody>
-                    <a:bodyPr anchorCtr="0"/>
-                    <a:lstStyle/>
-                    <a:p>
-                      <a:r>
-                        <a:rPr sz="1200" dirty="1">
-                          <a:latin typeface="Calibri"/>
-                        </a:rPr>
-                        <a:t>10124</a:t>
-                      </a:r>
-                    </a:p>
-                  </a:txBody>
-                  <a:tcPr>
-                    <a:solidFill>
-                      <a:srgbClr val="FFFFFF"/>
-                    </a:solidFill>
-                  </a:tcPr>
-                </a:tc>
               </a:tr>
               <a:tr h="254000">
                 <a:tc>
@@ -13324,25 +11937,6 @@
                     </a:solidFill>
                   </a:tcPr>
                 </a:tc>
-                <a:tc>
-                  <a:txBody>
-                    <a:bodyPr anchorCtr="0"/>
-                    <a:lstStyle/>
-                    <a:p>
-                      <a:r>
-                        <a:rPr sz="1200" dirty="1">
-                          <a:latin typeface="Calibri"/>
-                        </a:rPr>
-                        <a:t>10109</a:t>
-                      </a:r>
-                    </a:p>
-                  </a:txBody>
-                  <a:tcPr>
-                    <a:solidFill>
-                      <a:srgbClr val="F5F5F5"/>
-                    </a:solidFill>
-                  </a:tcPr>
-                </a:tc>
               </a:tr>
               <a:tr h="254000">
                 <a:tc>
@@ -13450,25 +12044,6 @@
                           <a:latin typeface="Calibri"/>
                         </a:rPr>
                         <a:t>Italy</a:t>
-                      </a:r>
-                    </a:p>
-                  </a:txBody>
-                  <a:tcPr>
-                    <a:solidFill>
-                      <a:srgbClr val="FFFFFF"/>
-                    </a:solidFill>
-                  </a:tcPr>
-                </a:tc>
-                <a:tc>
-                  <a:txBody>
-                    <a:bodyPr anchorCtr="0"/>
-                    <a:lstStyle/>
-                    <a:p>
-                      <a:r>
-                        <a:rPr sz="1200" dirty="1">
-                          <a:latin typeface="Calibri"/>
-                        </a:rPr>
-                        <a:t>10038</a:t>
                       </a:r>
                     </a:p>
                   </a:txBody>
@@ -13523,8 +12098,8 @@
           <p:nvPr/>
         </p:nvGraphicFramePr>
         <p:xfrm>
-          <a:off x="1079500" y="1016000"/>
-          <a:ext cx="8890000" cy="4937760"/>
+          <a:off x="762000" y="508000"/>
+          <a:ext cx="7620000" cy="4937760"/>
         </p:xfrm>
         <a:graphic>
           <a:graphicData uri="http://schemas.openxmlformats.org/drawingml/2006/table">
@@ -13539,7 +12114,6 @@
                 <a:gridCol w="1270000"/>
                 <a:gridCol w="1270000"/>
                 <a:gridCol w="1270000"/>
-                <a:gridCol w="1270000"/>
               </a:tblGrid>
               <a:tr h="254000">
                 <a:tc>
@@ -13557,7 +12131,7 @@
                   </a:txBody>
                   <a:tcPr>
                     <a:solidFill>
-                      <a:srgbClr val="FFFFFF"/>
+                      <a:srgbClr val="2980BA"/>
                     </a:solidFill>
                   </a:tcPr>
                 </a:tc>
@@ -13576,7 +12150,7 @@
                   </a:txBody>
                   <a:tcPr>
                     <a:solidFill>
-                      <a:srgbClr val="FFFFFF"/>
+                      <a:srgbClr val="2980BA"/>
                     </a:solidFill>
                   </a:tcPr>
                 </a:tc>
@@ -13595,7 +12169,7 @@
                   </a:txBody>
                   <a:tcPr>
                     <a:solidFill>
-                      <a:srgbClr val="FFFFFF"/>
+                      <a:srgbClr val="2980BA"/>
                     </a:solidFill>
                   </a:tcPr>
                 </a:tc>
@@ -13614,7 +12188,7 @@
                   </a:txBody>
                   <a:tcPr>
                     <a:solidFill>
-                      <a:srgbClr val="FFFFFF"/>
+                      <a:srgbClr val="2980BA"/>
                     </a:solidFill>
                   </a:tcPr>
                 </a:tc>
@@ -13633,7 +12207,7 @@
                   </a:txBody>
                   <a:tcPr>
                     <a:solidFill>
-                      <a:srgbClr val="FFFFFF"/>
+                      <a:srgbClr val="2980BA"/>
                     </a:solidFill>
                   </a:tcPr>
                 </a:tc>
@@ -13652,26 +12226,7 @@
                   </a:txBody>
                   <a:tcPr>
                     <a:solidFill>
-                      <a:srgbClr val="FFFFFF"/>
-                    </a:solidFill>
-                  </a:tcPr>
-                </a:tc>
-                <a:tc>
-                  <a:txBody>
-                    <a:bodyPr anchorCtr="0"/>
-                    <a:lstStyle/>
-                    <a:p>
-                      <a:r>
-                        <a:rPr sz="1200" dirty="1">
-                          <a:latin typeface="Calibri"/>
-                        </a:rPr>
-                        <a:t>Postal Code</a:t>
-                      </a:r>
-                    </a:p>
-                  </a:txBody>
-                  <a:tcPr>
-                    <a:solidFill>
-                      <a:srgbClr val="FFFFFF"/>
+                      <a:srgbClr val="2980BA"/>
                     </a:solidFill>
                   </a:tcPr>
                 </a:tc>
@@ -13791,25 +12346,6 @@
                     </a:solidFill>
                   </a:tcPr>
                 </a:tc>
-                <a:tc>
-                  <a:txBody>
-                    <a:bodyPr anchorCtr="0"/>
-                    <a:lstStyle/>
-                    <a:p>
-                      <a:r>
-                        <a:rPr sz="1200" dirty="1">
-                          <a:latin typeface="Calibri"/>
-                        </a:rPr>
-                        <a:t>10052</a:t>
-                      </a:r>
-                    </a:p>
-                  </a:txBody>
-                  <a:tcPr>
-                    <a:solidFill>
-                      <a:srgbClr val="F5F5F5"/>
-                    </a:solidFill>
-                  </a:tcPr>
-                </a:tc>
               </a:tr>
               <a:tr h="254000">
                 <a:tc>
@@ -13926,25 +12462,6 @@
                     </a:solidFill>
                   </a:tcPr>
                 </a:tc>
-                <a:tc>
-                  <a:txBody>
-                    <a:bodyPr anchorCtr="0"/>
-                    <a:lstStyle/>
-                    <a:p>
-                      <a:r>
-                        <a:rPr sz="1200" dirty="1">
-                          <a:latin typeface="Calibri"/>
-                        </a:rPr>
-                        <a:t>10122</a:t>
-                      </a:r>
-                    </a:p>
-                  </a:txBody>
-                  <a:tcPr>
-                    <a:solidFill>
-                      <a:srgbClr val="FFFFFF"/>
-                    </a:solidFill>
-                  </a:tcPr>
-                </a:tc>
               </a:tr>
               <a:tr h="254000">
                 <a:tc>
@@ -14061,25 +12578,6 @@
                     </a:solidFill>
                   </a:tcPr>
                 </a:tc>
-                <a:tc>
-                  <a:txBody>
-                    <a:bodyPr anchorCtr="0"/>
-                    <a:lstStyle/>
-                    <a:p>
-                      <a:r>
-                        <a:rPr sz="1200" dirty="1">
-                          <a:latin typeface="Calibri"/>
-                        </a:rPr>
-                        <a:t>10071</a:t>
-                      </a:r>
-                    </a:p>
-                  </a:txBody>
-                  <a:tcPr>
-                    <a:solidFill>
-                      <a:srgbClr val="F5F5F5"/>
-                    </a:solidFill>
-                  </a:tcPr>
-                </a:tc>
               </a:tr>
               <a:tr h="254000">
                 <a:tc>
@@ -14196,25 +12694,6 @@
                     </a:solidFill>
                   </a:tcPr>
                 </a:tc>
-                <a:tc>
-                  <a:txBody>
-                    <a:bodyPr anchorCtr="0"/>
-                    <a:lstStyle/>
-                    <a:p>
-                      <a:r>
-                        <a:rPr sz="1200" dirty="1">
-                          <a:latin typeface="Calibri"/>
-                        </a:rPr>
-                        <a:t>10123</a:t>
-                      </a:r>
-                    </a:p>
-                  </a:txBody>
-                  <a:tcPr>
-                    <a:solidFill>
-                      <a:srgbClr val="FFFFFF"/>
-                    </a:solidFill>
-                  </a:tcPr>
-                </a:tc>
               </a:tr>
               <a:tr h="254000">
                 <a:tc>
@@ -14331,25 +12810,6 @@
                     </a:solidFill>
                   </a:tcPr>
                 </a:tc>
-                <a:tc>
-                  <a:txBody>
-                    <a:bodyPr anchorCtr="0"/>
-                    <a:lstStyle/>
-                    <a:p>
-                      <a:r>
-                        <a:rPr sz="1200" dirty="1">
-                          <a:latin typeface="Calibri"/>
-                        </a:rPr>
-                        <a:t>10078</a:t>
-                      </a:r>
-                    </a:p>
-                  </a:txBody>
-                  <a:tcPr>
-                    <a:solidFill>
-                      <a:srgbClr val="F5F5F5"/>
-                    </a:solidFill>
-                  </a:tcPr>
-                </a:tc>
               </a:tr>
               <a:tr h="254000">
                 <a:tc>
@@ -14466,25 +12926,6 @@
                     </a:solidFill>
                   </a:tcPr>
                 </a:tc>
-                <a:tc>
-                  <a:txBody>
-                    <a:bodyPr anchorCtr="0"/>
-                    <a:lstStyle/>
-                    <a:p>
-                      <a:r>
-                        <a:rPr sz="1200" dirty="1">
-                          <a:latin typeface="Calibri"/>
-                        </a:rPr>
-                        <a:t>10088</a:t>
-                      </a:r>
-                    </a:p>
-                  </a:txBody>
-                  <a:tcPr>
-                    <a:solidFill>
-                      <a:srgbClr val="FFFFFF"/>
-                    </a:solidFill>
-                  </a:tcPr>
-                </a:tc>
               </a:tr>
               <a:tr h="254000">
                 <a:tc>
@@ -14601,25 +13042,6 @@
                     </a:solidFill>
                   </a:tcPr>
                 </a:tc>
-                <a:tc>
-                  <a:txBody>
-                    <a:bodyPr anchorCtr="0"/>
-                    <a:lstStyle/>
-                    <a:p>
-                      <a:r>
-                        <a:rPr sz="1200" dirty="1">
-                          <a:latin typeface="Calibri"/>
-                        </a:rPr>
-                        <a:t>10079</a:t>
-                      </a:r>
-                    </a:p>
-                  </a:txBody>
-                  <a:tcPr>
-                    <a:solidFill>
-                      <a:srgbClr val="F5F5F5"/>
-                    </a:solidFill>
-                  </a:tcPr>
-                </a:tc>
               </a:tr>
               <a:tr h="254000">
                 <a:tc>
@@ -14736,25 +13158,6 @@
                     </a:solidFill>
                   </a:tcPr>
                 </a:tc>
-                <a:tc>
-                  <a:txBody>
-                    <a:bodyPr anchorCtr="0"/>
-                    <a:lstStyle/>
-                    <a:p>
-                      <a:r>
-                        <a:rPr sz="1200" dirty="1">
-                          <a:latin typeface="Calibri"/>
-                        </a:rPr>
-                        <a:t>10058</a:t>
-                      </a:r>
-                    </a:p>
-                  </a:txBody>
-                  <a:tcPr>
-                    <a:solidFill>
-                      <a:srgbClr val="FFFFFF"/>
-                    </a:solidFill>
-                  </a:tcPr>
-                </a:tc>
               </a:tr>
               <a:tr h="254000">
                 <a:tc>
@@ -14871,25 +13274,6 @@
                     </a:solidFill>
                   </a:tcPr>
                 </a:tc>
-                <a:tc>
-                  <a:txBody>
-                    <a:bodyPr anchorCtr="0"/>
-                    <a:lstStyle/>
-                    <a:p>
-                      <a:r>
-                        <a:rPr sz="1200" dirty="1">
-                          <a:latin typeface="Calibri"/>
-                        </a:rPr>
-                        <a:t>10113</a:t>
-                      </a:r>
-                    </a:p>
-                  </a:txBody>
-                  <a:tcPr>
-                    <a:solidFill>
-                      <a:srgbClr val="F5F5F5"/>
-                    </a:solidFill>
-                  </a:tcPr>
-                </a:tc>
               </a:tr>
               <a:tr h="254000">
                 <a:tc>
@@ -15006,25 +13390,6 @@
                     </a:solidFill>
                   </a:tcPr>
                 </a:tc>
-                <a:tc>
-                  <a:txBody>
-                    <a:bodyPr anchorCtr="0"/>
-                    <a:lstStyle/>
-                    <a:p>
-                      <a:r>
-                        <a:rPr sz="1200" dirty="1">
-                          <a:latin typeface="Calibri"/>
-                        </a:rPr>
-                        <a:t>10100</a:t>
-                      </a:r>
-                    </a:p>
-                  </a:txBody>
-                  <a:tcPr>
-                    <a:solidFill>
-                      <a:srgbClr val="FFFFFF"/>
-                    </a:solidFill>
-                  </a:tcPr>
-                </a:tc>
               </a:tr>
               <a:tr h="254000">
                 <a:tc>
@@ -15132,25 +13497,6 @@
                           <a:latin typeface="Calibri"/>
                         </a:rPr>
                         <a:t>USA</a:t>
-                      </a:r>
-                    </a:p>
-                  </a:txBody>
-                  <a:tcPr>
-                    <a:solidFill>
-                      <a:srgbClr val="F5F5F5"/>
-                    </a:solidFill>
-                  </a:tcPr>
-                </a:tc>
-                <a:tc>
-                  <a:txBody>
-                    <a:bodyPr anchorCtr="0"/>
-                    <a:lstStyle/>
-                    <a:p>
-                      <a:r>
-                        <a:rPr sz="1200" dirty="1">
-                          <a:latin typeface="Calibri"/>
-                        </a:rPr>
-                        <a:t>10042</a:t>
                       </a:r>
                     </a:p>
                   </a:txBody>
@@ -15205,8 +13551,8 @@
           <p:nvPr/>
         </p:nvGraphicFramePr>
         <p:xfrm>
-          <a:off x="1079500" y="1016000"/>
-          <a:ext cx="8890000" cy="5120640"/>
+          <a:off x="762000" y="508000"/>
+          <a:ext cx="7620000" cy="5120640"/>
         </p:xfrm>
         <a:graphic>
           <a:graphicData uri="http://schemas.openxmlformats.org/drawingml/2006/table">
@@ -15221,7 +13567,6 @@
                 <a:gridCol w="1270000"/>
                 <a:gridCol w="1270000"/>
                 <a:gridCol w="1270000"/>
-                <a:gridCol w="1270000"/>
               </a:tblGrid>
               <a:tr h="254000">
                 <a:tc>
@@ -15239,7 +13584,7 @@
                   </a:txBody>
                   <a:tcPr>
                     <a:solidFill>
-                      <a:srgbClr val="FFFFFF"/>
+                      <a:srgbClr val="2980BA"/>
                     </a:solidFill>
                   </a:tcPr>
                 </a:tc>
@@ -15258,7 +13603,7 @@
                   </a:txBody>
                   <a:tcPr>
                     <a:solidFill>
-                      <a:srgbClr val="FFFFFF"/>
+                      <a:srgbClr val="2980BA"/>
                     </a:solidFill>
                   </a:tcPr>
                 </a:tc>
@@ -15277,7 +13622,7 @@
                   </a:txBody>
                   <a:tcPr>
                     <a:solidFill>
-                      <a:srgbClr val="FFFFFF"/>
+                      <a:srgbClr val="2980BA"/>
                     </a:solidFill>
                   </a:tcPr>
                 </a:tc>
@@ -15296,7 +13641,7 @@
                   </a:txBody>
                   <a:tcPr>
                     <a:solidFill>
-                      <a:srgbClr val="FFFFFF"/>
+                      <a:srgbClr val="2980BA"/>
                     </a:solidFill>
                   </a:tcPr>
                 </a:tc>
@@ -15315,7 +13660,7 @@
                   </a:txBody>
                   <a:tcPr>
                     <a:solidFill>
-                      <a:srgbClr val="FFFFFF"/>
+                      <a:srgbClr val="2980BA"/>
                     </a:solidFill>
                   </a:tcPr>
                 </a:tc>
@@ -15334,26 +13679,7 @@
                   </a:txBody>
                   <a:tcPr>
                     <a:solidFill>
-                      <a:srgbClr val="FFFFFF"/>
-                    </a:solidFill>
-                  </a:tcPr>
-                </a:tc>
-                <a:tc>
-                  <a:txBody>
-                    <a:bodyPr anchorCtr="0"/>
-                    <a:lstStyle/>
-                    <a:p>
-                      <a:r>
-                        <a:rPr sz="1200" dirty="1">
-                          <a:latin typeface="Calibri"/>
-                        </a:rPr>
-                        <a:t>Postal Code</a:t>
-                      </a:r>
-                    </a:p>
-                  </a:txBody>
-                  <a:tcPr>
-                    <a:solidFill>
-                      <a:srgbClr val="FFFFFF"/>
+                      <a:srgbClr val="2980BA"/>
                     </a:solidFill>
                   </a:tcPr>
                 </a:tc>
@@ -15473,25 +13799,6 @@
                     </a:solidFill>
                   </a:tcPr>
                 </a:tc>
-                <a:tc>
-                  <a:txBody>
-                    <a:bodyPr anchorCtr="0"/>
-                    <a:lstStyle/>
-                    <a:p>
-                      <a:r>
-                        <a:rPr sz="1200" dirty="1">
-                          <a:latin typeface="Calibri"/>
-                        </a:rPr>
-                        <a:t>10107</a:t>
-                      </a:r>
-                    </a:p>
-                  </a:txBody>
-                  <a:tcPr>
-                    <a:solidFill>
-                      <a:srgbClr val="FFFFFF"/>
-                    </a:solidFill>
-                  </a:tcPr>
-                </a:tc>
               </a:tr>
               <a:tr h="254000">
                 <a:tc>
@@ -15608,25 +13915,6 @@
                     </a:solidFill>
                   </a:tcPr>
                 </a:tc>
-                <a:tc>
-                  <a:txBody>
-                    <a:bodyPr anchorCtr="0"/>
-                    <a:lstStyle/>
-                    <a:p>
-                      <a:r>
-                        <a:rPr sz="1200" dirty="1">
-                          <a:latin typeface="Calibri"/>
-                        </a:rPr>
-                        <a:t>10118</a:t>
-                      </a:r>
-                    </a:p>
-                  </a:txBody>
-                  <a:tcPr>
-                    <a:solidFill>
-                      <a:srgbClr val="F5F5F5"/>
-                    </a:solidFill>
-                  </a:tcPr>
-                </a:tc>
               </a:tr>
               <a:tr h="254000">
                 <a:tc>
@@ -15743,25 +14031,6 @@
                     </a:solidFill>
                   </a:tcPr>
                 </a:tc>
-                <a:tc>
-                  <a:txBody>
-                    <a:bodyPr anchorCtr="0"/>
-                    <a:lstStyle/>
-                    <a:p>
-                      <a:r>
-                        <a:rPr sz="1200" dirty="1">
-                          <a:latin typeface="Calibri"/>
-                        </a:rPr>
-                        <a:t>10044</a:t>
-                      </a:r>
-                    </a:p>
-                  </a:txBody>
-                  <a:tcPr>
-                    <a:solidFill>
-                      <a:srgbClr val="FFFFFF"/>
-                    </a:solidFill>
-                  </a:tcPr>
-                </a:tc>
               </a:tr>
               <a:tr h="254000">
                 <a:tc>
@@ -15878,25 +14147,6 @@
                     </a:solidFill>
                   </a:tcPr>
                 </a:tc>
-                <a:tc>
-                  <a:txBody>
-                    <a:bodyPr anchorCtr="0"/>
-                    <a:lstStyle/>
-                    <a:p>
-                      <a:r>
-                        <a:rPr sz="1200" dirty="1">
-                          <a:latin typeface="Calibri"/>
-                        </a:rPr>
-                        <a:t>10120</a:t>
-                      </a:r>
-                    </a:p>
-                  </a:txBody>
-                  <a:tcPr>
-                    <a:solidFill>
-                      <a:srgbClr val="F5F5F5"/>
-                    </a:solidFill>
-                  </a:tcPr>
-                </a:tc>
               </a:tr>
               <a:tr h="254000">
                 <a:tc>
@@ -16013,25 +14263,6 @@
                     </a:solidFill>
                   </a:tcPr>
                 </a:tc>
-                <a:tc>
-                  <a:txBody>
-                    <a:bodyPr anchorCtr="0"/>
-                    <a:lstStyle/>
-                    <a:p>
-                      <a:r>
-                        <a:rPr sz="1200" dirty="1">
-                          <a:latin typeface="Calibri"/>
-                        </a:rPr>
-                        <a:t>10119</a:t>
-                      </a:r>
-                    </a:p>
-                  </a:txBody>
-                  <a:tcPr>
-                    <a:solidFill>
-                      <a:srgbClr val="FFFFFF"/>
-                    </a:solidFill>
-                  </a:tcPr>
-                </a:tc>
               </a:tr>
               <a:tr h="254000">
                 <a:tc>
@@ -16148,25 +14379,6 @@
                     </a:solidFill>
                   </a:tcPr>
                 </a:tc>
-                <a:tc>
-                  <a:txBody>
-                    <a:bodyPr anchorCtr="0"/>
-                    <a:lstStyle/>
-                    <a:p>
-                      <a:r>
-                        <a:rPr sz="1200" dirty="1">
-                          <a:latin typeface="Calibri"/>
-                        </a:rPr>
-                        <a:t>10090</a:t>
-                      </a:r>
-                    </a:p>
-                  </a:txBody>
-                  <a:tcPr>
-                    <a:solidFill>
-                      <a:srgbClr val="F5F5F5"/>
-                    </a:solidFill>
-                  </a:tcPr>
-                </a:tc>
               </a:tr>
               <a:tr h="254000">
                 <a:tc>
@@ -16283,25 +14495,6 @@
                     </a:solidFill>
                   </a:tcPr>
                 </a:tc>
-                <a:tc>
-                  <a:txBody>
-                    <a:bodyPr anchorCtr="0"/>
-                    <a:lstStyle/>
-                    <a:p>
-                      <a:r>
-                        <a:rPr sz="1200" dirty="1">
-                          <a:latin typeface="Calibri"/>
-                        </a:rPr>
-                        <a:t>10072</a:t>
-                      </a:r>
-                    </a:p>
-                  </a:txBody>
-                  <a:tcPr>
-                    <a:solidFill>
-                      <a:srgbClr val="FFFFFF"/>
-                    </a:solidFill>
-                  </a:tcPr>
-                </a:tc>
               </a:tr>
               <a:tr h="254000">
                 <a:tc>
@@ -16418,25 +14611,6 @@
                     </a:solidFill>
                   </a:tcPr>
                 </a:tc>
-                <a:tc>
-                  <a:txBody>
-                    <a:bodyPr anchorCtr="0"/>
-                    <a:lstStyle/>
-                    <a:p>
-                      <a:r>
-                        <a:rPr sz="1200" dirty="1">
-                          <a:latin typeface="Calibri"/>
-                        </a:rPr>
-                        <a:t>10082</a:t>
-                      </a:r>
-                    </a:p>
-                  </a:txBody>
-                  <a:tcPr>
-                    <a:solidFill>
-                      <a:srgbClr val="F5F5F5"/>
-                    </a:solidFill>
-                  </a:tcPr>
-                </a:tc>
               </a:tr>
               <a:tr h="254000">
                 <a:tc>
@@ -16553,25 +14727,6 @@
                     </a:solidFill>
                   </a:tcPr>
                 </a:tc>
-                <a:tc>
-                  <a:txBody>
-                    <a:bodyPr anchorCtr="0"/>
-                    <a:lstStyle/>
-                    <a:p>
-                      <a:r>
-                        <a:rPr sz="1200" dirty="1">
-                          <a:latin typeface="Calibri"/>
-                        </a:rPr>
-                        <a:t>10086</a:t>
-                      </a:r>
-                    </a:p>
-                  </a:txBody>
-                  <a:tcPr>
-                    <a:solidFill>
-                      <a:srgbClr val="FFFFFF"/>
-                    </a:solidFill>
-                  </a:tcPr>
-                </a:tc>
               </a:tr>
               <a:tr h="254000">
                 <a:tc>
@@ -16688,25 +14843,6 @@
                     </a:solidFill>
                   </a:tcPr>
                 </a:tc>
-                <a:tc>
-                  <a:txBody>
-                    <a:bodyPr anchorCtr="0"/>
-                    <a:lstStyle/>
-                    <a:p>
-                      <a:r>
-                        <a:rPr sz="1200" dirty="1">
-                          <a:latin typeface="Calibri"/>
-                        </a:rPr>
-                        <a:t>10045</a:t>
-                      </a:r>
-                    </a:p>
-                  </a:txBody>
-                  <a:tcPr>
-                    <a:solidFill>
-                      <a:srgbClr val="F5F5F5"/>
-                    </a:solidFill>
-                  </a:tcPr>
-                </a:tc>
               </a:tr>
               <a:tr h="254000">
                 <a:tc>
@@ -16814,25 +14950,6 @@
                           <a:latin typeface="Calibri"/>
                         </a:rPr>
                         <a:t>Brazil</a:t>
-                      </a:r>
-                    </a:p>
-                  </a:txBody>
-                  <a:tcPr>
-                    <a:solidFill>
-                      <a:srgbClr val="FFFFFF"/>
-                    </a:solidFill>
-                  </a:tcPr>
-                </a:tc>
-                <a:tc>
-                  <a:txBody>
-                    <a:bodyPr anchorCtr="0"/>
-                    <a:lstStyle/>
-                    <a:p>
-                      <a:r>
-                        <a:rPr sz="1200" dirty="1">
-                          <a:latin typeface="Calibri"/>
-                        </a:rPr>
-                        <a:t>10084</a:t>
                       </a:r>
                     </a:p>
                   </a:txBody>
@@ -16887,8 +15004,8 @@
           <p:nvPr/>
         </p:nvGraphicFramePr>
         <p:xfrm>
-          <a:off x="1079500" y="1016000"/>
-          <a:ext cx="8890000" cy="5120640"/>
+          <a:off x="762000" y="508000"/>
+          <a:ext cx="7620000" cy="5120640"/>
         </p:xfrm>
         <a:graphic>
           <a:graphicData uri="http://schemas.openxmlformats.org/drawingml/2006/table">
@@ -16903,7 +15020,6 @@
                 <a:gridCol w="1270000"/>
                 <a:gridCol w="1270000"/>
                 <a:gridCol w="1270000"/>
-                <a:gridCol w="1270000"/>
               </a:tblGrid>
               <a:tr h="254000">
                 <a:tc>
@@ -16921,7 +15037,7 @@
                   </a:txBody>
                   <a:tcPr>
                     <a:solidFill>
-                      <a:srgbClr val="FFFFFF"/>
+                      <a:srgbClr val="2980BA"/>
                     </a:solidFill>
                   </a:tcPr>
                 </a:tc>
@@ -16940,7 +15056,7 @@
                   </a:txBody>
                   <a:tcPr>
                     <a:solidFill>
-                      <a:srgbClr val="FFFFFF"/>
+                      <a:srgbClr val="2980BA"/>
                     </a:solidFill>
                   </a:tcPr>
                 </a:tc>
@@ -16959,7 +15075,7 @@
                   </a:txBody>
                   <a:tcPr>
                     <a:solidFill>
-                      <a:srgbClr val="FFFFFF"/>
+                      <a:srgbClr val="2980BA"/>
                     </a:solidFill>
                   </a:tcPr>
                 </a:tc>
@@ -16978,7 +15094,7 @@
                   </a:txBody>
                   <a:tcPr>
                     <a:solidFill>
-                      <a:srgbClr val="FFFFFF"/>
+                      <a:srgbClr val="2980BA"/>
                     </a:solidFill>
                   </a:tcPr>
                 </a:tc>
@@ -16997,7 +15113,7 @@
                   </a:txBody>
                   <a:tcPr>
                     <a:solidFill>
-                      <a:srgbClr val="FFFFFF"/>
+                      <a:srgbClr val="2980BA"/>
                     </a:solidFill>
                   </a:tcPr>
                 </a:tc>
@@ -17016,26 +15132,7 @@
                   </a:txBody>
                   <a:tcPr>
                     <a:solidFill>
-                      <a:srgbClr val="FFFFFF"/>
-                    </a:solidFill>
-                  </a:tcPr>
-                </a:tc>
-                <a:tc>
-                  <a:txBody>
-                    <a:bodyPr anchorCtr="0"/>
-                    <a:lstStyle/>
-                    <a:p>
-                      <a:r>
-                        <a:rPr sz="1200" dirty="1">
-                          <a:latin typeface="Calibri"/>
-                        </a:rPr>
-                        <a:t>Postal Code</a:t>
-                      </a:r>
-                    </a:p>
-                  </a:txBody>
-                  <a:tcPr>
-                    <a:solidFill>
-                      <a:srgbClr val="FFFFFF"/>
+                      <a:srgbClr val="2980BA"/>
                     </a:solidFill>
                   </a:tcPr>
                 </a:tc>
@@ -17155,25 +15252,6 @@
                     </a:solidFill>
                   </a:tcPr>
                 </a:tc>
-                <a:tc>
-                  <a:txBody>
-                    <a:bodyPr anchorCtr="0"/>
-                    <a:lstStyle/>
-                    <a:p>
-                      <a:r>
-                        <a:rPr sz="1200" dirty="1">
-                          <a:latin typeface="Calibri"/>
-                        </a:rPr>
-                        <a:t>10049</a:t>
-                      </a:r>
-                    </a:p>
-                  </a:txBody>
-                  <a:tcPr>
-                    <a:solidFill>
-                      <a:srgbClr val="F5F5F5"/>
-                    </a:solidFill>
-                  </a:tcPr>
-                </a:tc>
               </a:tr>
               <a:tr h="254000">
                 <a:tc>
@@ -17290,25 +15368,6 @@
                     </a:solidFill>
                   </a:tcPr>
                 </a:tc>
-                <a:tc>
-                  <a:txBody>
-                    <a:bodyPr anchorCtr="0"/>
-                    <a:lstStyle/>
-                    <a:p>
-                      <a:r>
-                        <a:rPr sz="1200" dirty="1">
-                          <a:latin typeface="Calibri"/>
-                        </a:rPr>
-                        <a:t>10055</a:t>
-                      </a:r>
-                    </a:p>
-                  </a:txBody>
-                  <a:tcPr>
-                    <a:solidFill>
-                      <a:srgbClr val="FFFFFF"/>
-                    </a:solidFill>
-                  </a:tcPr>
-                </a:tc>
               </a:tr>
               <a:tr h="254000">
                 <a:tc>
@@ -17425,25 +15484,6 @@
                     </a:solidFill>
                   </a:tcPr>
                 </a:tc>
-                <a:tc>
-                  <a:txBody>
-                    <a:bodyPr anchorCtr="0"/>
-                    <a:lstStyle/>
-                    <a:p>
-                      <a:r>
-                        <a:rPr sz="1200" dirty="1">
-                          <a:latin typeface="Calibri"/>
-                        </a:rPr>
-                        <a:t>10068</a:t>
-                      </a:r>
-                    </a:p>
-                  </a:txBody>
-                  <a:tcPr>
-                    <a:solidFill>
-                      <a:srgbClr val="F5F5F5"/>
-                    </a:solidFill>
-                  </a:tcPr>
-                </a:tc>
               </a:tr>
               <a:tr h="254000">
                 <a:tc>
@@ -17560,25 +15600,6 @@
                     </a:solidFill>
                   </a:tcPr>
                 </a:tc>
-                <a:tc>
-                  <a:txBody>
-                    <a:bodyPr anchorCtr="0"/>
-                    <a:lstStyle/>
-                    <a:p>
-                      <a:r>
-                        <a:rPr sz="1200" dirty="1">
-                          <a:latin typeface="Calibri"/>
-                        </a:rPr>
-                        <a:t>10092</a:t>
-                      </a:r>
-                    </a:p>
-                  </a:txBody>
-                  <a:tcPr>
-                    <a:solidFill>
-                      <a:srgbClr val="FFFFFF"/>
-                    </a:solidFill>
-                  </a:tcPr>
-                </a:tc>
               </a:tr>
               <a:tr h="254000">
                 <a:tc>
@@ -17695,25 +15716,6 @@
                     </a:solidFill>
                   </a:tcPr>
                 </a:tc>
-                <a:tc>
-                  <a:txBody>
-                    <a:bodyPr anchorCtr="0"/>
-                    <a:lstStyle/>
-                    <a:p>
-                      <a:r>
-                        <a:rPr sz="1200" dirty="1">
-                          <a:latin typeface="Calibri"/>
-                        </a:rPr>
-                        <a:t>10092</a:t>
-                      </a:r>
-                    </a:p>
-                  </a:txBody>
-                  <a:tcPr>
-                    <a:solidFill>
-                      <a:srgbClr val="F5F5F5"/>
-                    </a:solidFill>
-                  </a:tcPr>
-                </a:tc>
               </a:tr>
               <a:tr h="254000">
                 <a:tc>
@@ -17830,25 +15832,6 @@
                     </a:solidFill>
                   </a:tcPr>
                 </a:tc>
-                <a:tc>
-                  <a:txBody>
-                    <a:bodyPr anchorCtr="0"/>
-                    <a:lstStyle/>
-                    <a:p>
-                      <a:r>
-                        <a:rPr sz="1200" dirty="1">
-                          <a:latin typeface="Calibri"/>
-                        </a:rPr>
-                        <a:t>10092</a:t>
-                      </a:r>
-                    </a:p>
-                  </a:txBody>
-                  <a:tcPr>
-                    <a:solidFill>
-                      <a:srgbClr val="FFFFFF"/>
-                    </a:solidFill>
-                  </a:tcPr>
-                </a:tc>
               </a:tr>
               <a:tr h="254000">
                 <a:tc>
@@ -17965,25 +15948,6 @@
                     </a:solidFill>
                   </a:tcPr>
                 </a:tc>
-                <a:tc>
-                  <a:txBody>
-                    <a:bodyPr anchorCtr="0"/>
-                    <a:lstStyle/>
-                    <a:p>
-                      <a:r>
-                        <a:rPr sz="1200" dirty="1">
-                          <a:latin typeface="Calibri"/>
-                        </a:rPr>
-                        <a:t>10092</a:t>
-                      </a:r>
-                    </a:p>
-                  </a:txBody>
-                  <a:tcPr>
-                    <a:solidFill>
-                      <a:srgbClr val="F5F5F5"/>
-                    </a:solidFill>
-                  </a:tcPr>
-                </a:tc>
               </a:tr>
               <a:tr h="254000">
                 <a:tc>
@@ -18100,25 +16064,6 @@
                     </a:solidFill>
                   </a:tcPr>
                 </a:tc>
-                <a:tc>
-                  <a:txBody>
-                    <a:bodyPr anchorCtr="0"/>
-                    <a:lstStyle/>
-                    <a:p>
-                      <a:r>
-                        <a:rPr sz="1200" dirty="1">
-                          <a:latin typeface="Calibri"/>
-                        </a:rPr>
-                        <a:t>10092</a:t>
-                      </a:r>
-                    </a:p>
-                  </a:txBody>
-                  <a:tcPr>
-                    <a:solidFill>
-                      <a:srgbClr val="FFFFFF"/>
-                    </a:solidFill>
-                  </a:tcPr>
-                </a:tc>
               </a:tr>
               <a:tr h="254000">
                 <a:tc>
@@ -18235,25 +16180,6 @@
                     </a:solidFill>
                   </a:tcPr>
                 </a:tc>
-                <a:tc>
-                  <a:txBody>
-                    <a:bodyPr anchorCtr="0"/>
-                    <a:lstStyle/>
-                    <a:p>
-                      <a:r>
-                        <a:rPr sz="1200" dirty="1">
-                          <a:latin typeface="Calibri"/>
-                        </a:rPr>
-                        <a:t>10092</a:t>
-                      </a:r>
-                    </a:p>
-                  </a:txBody>
-                  <a:tcPr>
-                    <a:solidFill>
-                      <a:srgbClr val="F5F5F5"/>
-                    </a:solidFill>
-                  </a:tcPr>
-                </a:tc>
               </a:tr>
               <a:tr h="254000">
                 <a:tc>
@@ -18370,25 +16296,6 @@
                     </a:solidFill>
                   </a:tcPr>
                 </a:tc>
-                <a:tc>
-                  <a:txBody>
-                    <a:bodyPr anchorCtr="0"/>
-                    <a:lstStyle/>
-                    <a:p>
-                      <a:r>
-                        <a:rPr sz="1200" dirty="1">
-                          <a:latin typeface="Calibri"/>
-                        </a:rPr>
-                        <a:t>10092</a:t>
-                      </a:r>
-                    </a:p>
-                  </a:txBody>
-                  <a:tcPr>
-                    <a:solidFill>
-                      <a:srgbClr val="FFFFFF"/>
-                    </a:solidFill>
-                  </a:tcPr>
-                </a:tc>
               </a:tr>
               <a:tr h="254000">
                 <a:tc>
@@ -18496,25 +16403,6 @@
                           <a:latin typeface="Calibri"/>
                         </a:rPr>
                         <a:t>France</a:t>
-                      </a:r>
-                    </a:p>
-                  </a:txBody>
-                  <a:tcPr>
-                    <a:solidFill>
-                      <a:srgbClr val="F5F5F5"/>
-                    </a:solidFill>
-                  </a:tcPr>
-                </a:tc>
-                <a:tc>
-                  <a:txBody>
-                    <a:bodyPr anchorCtr="0"/>
-                    <a:lstStyle/>
-                    <a:p>
-                      <a:r>
-                        <a:rPr sz="1200" dirty="1">
-                          <a:latin typeface="Calibri"/>
-                        </a:rPr>
-                        <a:t>10092</a:t>
                       </a:r>
                     </a:p>
                   </a:txBody>
@@ -18601,71 +16489,71 @@
         <a:latin typeface="Calibri"/>
         <a:ea typeface=""/>
         <a:cs typeface=""/>
+        <a:font script="Guru" typeface="Raavi"/>
+        <a:font script="Ethi" typeface="Nyala"/>
+        <a:font script="Taml" typeface="Latha"/>
+        <a:font script="Cher" typeface="Plantagenet Cherokee"/>
+        <a:font script="Jpan" typeface="ＭＳ Ｐゴシック"/>
+        <a:font script="Mlym" typeface="Kartika"/>
+        <a:font script="Laoo" typeface="DokChampa"/>
+        <a:font script="Hans" typeface="宋体"/>
+        <a:font script="Uigh" typeface="Microsoft Uighur"/>
+        <a:font script="Cans" typeface="Euphemia"/>
+        <a:font script="Gujr" typeface="Shruti"/>
+        <a:font script="Telu" typeface="Gautami"/>
         <a:font script="Viet" typeface="Times New Roman"/>
-        <a:font script="Ethi" typeface="Nyala"/>
-        <a:font script="Telu" typeface="Gautami"/>
-        <a:font script="Cher" typeface="Plantagenet Cherokee"/>
+        <a:font script="Orya" typeface="Kalinga"/>
+        <a:font script="Thai" typeface="Angsana New"/>
+        <a:font script="Hebr" typeface="Times New Roman"/>
+        <a:font script="Hant" typeface="新細明體"/>
+        <a:font script="Tibt" typeface="Microsoft Himalaya"/>
+        <a:font script="Deva" typeface="Mangal"/>
+        <a:font script="Hang" typeface="맑은 고딕"/>
+        <a:font script="Syrc" typeface="Estrangelo Edessa"/>
         <a:font script="Geor" typeface="Sylfaen"/>
-        <a:font script="Gujr" typeface="Shruti"/>
-        <a:font script="Jpan" typeface="ＭＳ Ｐゴシック"/>
-        <a:font script="Laoo" typeface="DokChampa"/>
-        <a:font script="Syrc" typeface="Estrangelo Edessa"/>
-        <a:font script="Guru" typeface="Raavi"/>
-        <a:font script="Khmr" typeface="MoolBoran"/>
-        <a:font script="Tibt" typeface="Microsoft Himalaya"/>
-        <a:font script="Hans" typeface="宋体"/>
+        <a:font script="Arab" typeface="Times New Roman"/>
+        <a:font script="Thaa" typeface="MV Boli"/>
         <a:font script="Beng" typeface="Vrinda"/>
         <a:font script="Mong" typeface="Mongolian Baiti"/>
         <a:font script="Sinh" typeface="Iskoola Pota"/>
-        <a:font script="Hebr" typeface="Times New Roman"/>
-        <a:font script="Cans" typeface="Euphemia"/>
+        <a:font script="Yiii" typeface="Microsoft Yi Baiti"/>
         <a:font script="Knda" typeface="Tunga"/>
-        <a:font script="Hang" typeface="맑은 고딕"/>
-        <a:font script="Yiii" typeface="Microsoft Yi Baiti"/>
-        <a:font script="Orya" typeface="Kalinga"/>
-        <a:font script="Thaa" typeface="MV Boli"/>
-        <a:font script="Taml" typeface="Latha"/>
-        <a:font script="Arab" typeface="Times New Roman"/>
-        <a:font script="Hant" typeface="新細明體"/>
-        <a:font script="Deva" typeface="Mangal"/>
-        <a:font script="Thai" typeface="Angsana New"/>
-        <a:font script="Mlym" typeface="Kartika"/>
-        <a:font script="Uigh" typeface="Microsoft Uighur"/>
+        <a:font script="Khmr" typeface="MoolBoran"/>
       </a:majorFont>
       <a:minorFont>
         <a:latin typeface="Calibri"/>
         <a:ea typeface=""/>
         <a:cs typeface=""/>
+        <a:font script="Guru" typeface="Raavi"/>
+        <a:font script="Ethi" typeface="Nyala"/>
+        <a:font script="Taml" typeface="Latha"/>
+        <a:font script="Cher" typeface="Plantagenet Cherokee"/>
+        <a:font script="Jpan" typeface="ＭＳ Ｐゴシック"/>
+        <a:font script="Mlym" typeface="Kartika"/>
+        <a:font script="Laoo" typeface="DokChampa"/>
+        <a:font script="Hans" typeface="宋体"/>
+        <a:font script="Uigh" typeface="Microsoft Uighur"/>
+        <a:font script="Cans" typeface="Euphemia"/>
+        <a:font script="Gujr" typeface="Shruti"/>
+        <a:font script="Telu" typeface="Gautami"/>
         <a:font script="Viet" typeface="Arial"/>
-        <a:font script="Ethi" typeface="Nyala"/>
-        <a:font script="Telu" typeface="Gautami"/>
-        <a:font script="Cher" typeface="Plantagenet Cherokee"/>
+        <a:font script="Orya" typeface="Kalinga"/>
+        <a:font script="Thai" typeface="Cordia New"/>
+        <a:font script="Hebr" typeface="Arial"/>
+        <a:font script="Hant" typeface="新細明體"/>
+        <a:font script="Tibt" typeface="Microsoft Himalaya"/>
+        <a:font script="Deva" typeface="Mangal"/>
+        <a:font script="Hang" typeface="맑은 고딕"/>
+        <a:font script="Syrc" typeface="Estrangelo Edessa"/>
         <a:font script="Geor" typeface="Sylfaen"/>
-        <a:font script="Gujr" typeface="Shruti"/>
-        <a:font script="Jpan" typeface="ＭＳ Ｐゴシック"/>
-        <a:font script="Laoo" typeface="DokChampa"/>
-        <a:font script="Syrc" typeface="Estrangelo Edessa"/>
-        <a:font script="Guru" typeface="Raavi"/>
-        <a:font script="Khmr" typeface="DaunPenh"/>
-        <a:font script="Tibt" typeface="Microsoft Himalaya"/>
-        <a:font script="Hans" typeface="宋体"/>
+        <a:font script="Arab" typeface="Arial"/>
+        <a:font script="Thaa" typeface="MV Boli"/>
         <a:font script="Beng" typeface="Vrinda"/>
         <a:font script="Mong" typeface="Mongolian Baiti"/>
         <a:font script="Sinh" typeface="Iskoola Pota"/>
-        <a:font script="Hebr" typeface="Arial"/>
-        <a:font script="Cans" typeface="Euphemia"/>
+        <a:font script="Yiii" typeface="Microsoft Yi Baiti"/>
         <a:font script="Knda" typeface="Tunga"/>
-        <a:font script="Hang" typeface="맑은 고딕"/>
-        <a:font script="Yiii" typeface="Microsoft Yi Baiti"/>
-        <a:font script="Orya" typeface="Kalinga"/>
-        <a:font script="Thaa" typeface="MV Boli"/>
-        <a:font script="Taml" typeface="Latha"/>
-        <a:font script="Arab" typeface="Arial"/>
-        <a:font script="Hant" typeface="新細明體"/>
-        <a:font script="Deva" typeface="Mangal"/>
-        <a:font script="Thai" typeface="Cordia New"/>
-        <a:font script="Mlym" typeface="Kartika"/>
-        <a:font script="Uigh" typeface="Microsoft Uighur"/>
+        <a:font script="Khmr" typeface="DaunPenh"/>
       </a:minorFont>
     </a:fontScheme>
     <a:fmtScheme name="Office">

</xml_diff>